<commit_message>
Box and Plane added
</commit_message>
<xml_diff>
--- a/documents/MATERIAL.pptx
+++ b/documents/MATERIAL.pptx
@@ -7,7 +7,8 @@
   <p:sldIdLst>
     <p:sldId id="268" r:id="rId5"/>
     <p:sldId id="310" r:id="rId6"/>
-    <p:sldId id="311" r:id="rId7"/>
+    <p:sldId id="312" r:id="rId7"/>
+    <p:sldId id="311" r:id="rId8"/>
   </p:sldIdLst>
   <p:sldSz cx="12192000" cy="6858000"/>
   <p:notesSz cx="6858000" cy="9144000"/>
@@ -358,7 +359,7 @@
           <a:p>
             <a:fld id="{9184DA70-C731-4C70-880D-CCD4705E623C}" type="datetime1">
               <a:rPr lang="en-US" smtClean="0"/>
-              <a:t>21-Apr-20</a:t>
+              <a:t>22-Apr-20</a:t>
             </a:fld>
             <a:endParaRPr lang="en-US" dirty="0"/>
           </a:p>
@@ -546,7 +547,7 @@
           <a:p>
             <a:fld id="{4BE1D723-8F53-4F53-90B0-1982A396982E}" type="datetime1">
               <a:rPr lang="en-US" smtClean="0"/>
-              <a:t>21-Apr-20</a:t>
+              <a:t>22-Apr-20</a:t>
             </a:fld>
             <a:endParaRPr lang="en-US" dirty="0"/>
           </a:p>
@@ -919,7 +920,7 @@
           <a:p>
             <a:fld id="{97669AF7-7BEB-44E4-9852-375E34362B5B}" type="datetime1">
               <a:rPr lang="en-US" smtClean="0"/>
-              <a:t>21-Apr-20</a:t>
+              <a:t>22-Apr-20</a:t>
             </a:fld>
             <a:endParaRPr lang="en-US" dirty="0"/>
           </a:p>
@@ -1174,7 +1175,7 @@
           <a:p>
             <a:fld id="{BAAAC38D-0552-4C82-B593-E6124DFADBE2}" type="datetime1">
               <a:rPr lang="en-US" smtClean="0"/>
-              <a:t>21-Apr-20</a:t>
+              <a:t>22-Apr-20</a:t>
             </a:fld>
             <a:endParaRPr lang="en-US" dirty="0"/>
           </a:p>
@@ -1571,7 +1572,7 @@
           <a:p>
             <a:fld id="{D9DF0F1C-5577-4ACB-BB62-DF8F3C494C7E}" type="datetime1">
               <a:rPr lang="en-US" smtClean="0"/>
-              <a:t>21-Apr-20</a:t>
+              <a:t>22-Apr-20</a:t>
             </a:fld>
             <a:endParaRPr lang="en-US" dirty="0"/>
           </a:p>
@@ -1707,7 +1708,7 @@
           <a:p>
             <a:fld id="{1775B394-D9F9-4F0C-B15D-605F45CB9E9F}" type="datetime1">
               <a:rPr lang="en-US" smtClean="0"/>
-              <a:t>21-Apr-20</a:t>
+              <a:t>22-Apr-20</a:t>
             </a:fld>
             <a:endParaRPr lang="en-US" dirty="0"/>
           </a:p>
@@ -1864,7 +1865,7 @@
           <a:p>
             <a:fld id="{39667345-2558-425A-8533-9BFDBCE15005}" type="datetime1">
               <a:rPr lang="en-US" smtClean="0"/>
-              <a:t>21-Apr-20</a:t>
+              <a:t>22-Apr-20</a:t>
             </a:fld>
             <a:endParaRPr lang="en-US" dirty="0"/>
           </a:p>
@@ -2193,7 +2194,7 @@
           <a:p>
             <a:fld id="{92BEA474-078D-4E9B-9B14-09A87B19DC46}" type="datetime1">
               <a:rPr lang="en-US" smtClean="0"/>
-              <a:t>21-Apr-20</a:t>
+              <a:t>22-Apr-20</a:t>
             </a:fld>
             <a:endParaRPr lang="en-US" dirty="0"/>
           </a:p>
@@ -2543,7 +2544,7 @@
           <a:p>
             <a:fld id="{4907D986-8816-4272-A432-0437A28A9828}" type="datetime1">
               <a:rPr lang="en-US" smtClean="0"/>
-              <a:t>21-Apr-20</a:t>
+              <a:t>22-Apr-20</a:t>
             </a:fld>
             <a:endParaRPr lang="en-US" dirty="0"/>
           </a:p>
@@ -2804,7 +2805,7 @@
           <a:p>
             <a:fld id="{62D6E202-B606-4609-B914-27C9371A1F6D}" type="datetime1">
               <a:rPr lang="en-US" smtClean="0"/>
-              <a:t>21-Apr-20</a:t>
+              <a:t>22-Apr-20</a:t>
             </a:fld>
             <a:endParaRPr lang="en-US" dirty="0"/>
           </a:p>
@@ -3942,6 +3943,463 @@
           <p:cNvPr id="2" name="Title 1">
             <a:extLst>
               <a:ext uri="{FF2B5EF4-FFF2-40B4-BE49-F238E27FC236}">
+                <a16:creationId xmlns:a16="http://schemas.microsoft.com/office/drawing/2014/main" id="{4EC0E574-6AAA-40CF-A3A9-5CBC00FBE6B6}"/>
+              </a:ext>
+            </a:extLst>
+          </p:cNvPr>
+          <p:cNvSpPr>
+            <a:spLocks noGrp="1"/>
+          </p:cNvSpPr>
+          <p:nvPr>
+            <p:ph type="title"/>
+          </p:nvPr>
+        </p:nvSpPr>
+        <p:spPr/>
+        <p:txBody>
+          <a:bodyPr/>
+          <a:lstStyle/>
+          <a:p>
+            <a:r>
+              <a:rPr lang="en-US" dirty="0" err="1"/>
+              <a:t>Properti</a:t>
+            </a:r>
+            <a:r>
+              <a:rPr lang="en-US" dirty="0"/>
+              <a:t> material</a:t>
+            </a:r>
+            <a:endParaRPr lang="id-ID" dirty="0"/>
+          </a:p>
+        </p:txBody>
+      </p:sp>
+      <p:graphicFrame>
+        <p:nvGraphicFramePr>
+          <p:cNvPr id="6" name="Table 6">
+            <a:extLst>
+              <a:ext uri="{FF2B5EF4-FFF2-40B4-BE49-F238E27FC236}">
+                <a16:creationId xmlns:a16="http://schemas.microsoft.com/office/drawing/2014/main" id="{946BD124-7AD0-4E27-87B9-1CCD5AA5FDEB}"/>
+              </a:ext>
+            </a:extLst>
+          </p:cNvPr>
+          <p:cNvGraphicFramePr>
+            <a:graphicFrameLocks noGrp="1"/>
+          </p:cNvGraphicFramePr>
+          <p:nvPr>
+            <p:ph idx="1"/>
+            <p:extLst>
+              <p:ext uri="{D42A27DB-BD31-4B8C-83A1-F6EECF244321}">
+                <p14:modId xmlns:p14="http://schemas.microsoft.com/office/powerpoint/2010/main" val="1844837504"/>
+              </p:ext>
+            </p:extLst>
+          </p:nvPr>
+        </p:nvGraphicFramePr>
+        <p:xfrm>
+          <a:off x="1096963" y="2108200"/>
+          <a:ext cx="10058400" cy="3708400"/>
+        </p:xfrm>
+        <a:graphic>
+          <a:graphicData uri="http://schemas.openxmlformats.org/drawingml/2006/table">
+            <a:tbl>
+              <a:tblPr firstRow="1" bandRow="1">
+                <a:tableStyleId>{3B4B98B0-60AC-42C2-AFA5-B58CD77FA1E5}</a:tableStyleId>
+              </a:tblPr>
+              <a:tblGrid>
+                <a:gridCol w="5029200">
+                  <a:extLst>
+                    <a:ext uri="{9D8B030D-6E8A-4147-A177-3AD203B41FA5}">
+                      <a16:colId xmlns:a16="http://schemas.microsoft.com/office/drawing/2014/main" val="2874961603"/>
+                    </a:ext>
+                  </a:extLst>
+                </a:gridCol>
+                <a:gridCol w="5029200">
+                  <a:extLst>
+                    <a:ext uri="{9D8B030D-6E8A-4147-A177-3AD203B41FA5}">
+                      <a16:colId xmlns:a16="http://schemas.microsoft.com/office/drawing/2014/main" val="3748562219"/>
+                    </a:ext>
+                  </a:extLst>
+                </a:gridCol>
+              </a:tblGrid>
+              <a:tr h="370840">
+                <a:tc>
+                  <a:txBody>
+                    <a:bodyPr/>
+                    <a:lstStyle/>
+                    <a:p>
+                      <a:pPr algn="ctr"/>
+                      <a:r>
+                        <a:rPr lang="en-US" dirty="0" err="1"/>
+                        <a:t>Properti</a:t>
+                      </a:r>
+                      <a:endParaRPr lang="id-ID" dirty="0"/>
+                    </a:p>
+                  </a:txBody>
+                  <a:tcPr/>
+                </a:tc>
+                <a:tc>
+                  <a:txBody>
+                    <a:bodyPr/>
+                    <a:lstStyle/>
+                    <a:p>
+                      <a:pPr algn="ctr"/>
+                      <a:r>
+                        <a:rPr lang="en-US" dirty="0" err="1"/>
+                        <a:t>Fungsi</a:t>
+                      </a:r>
+                      <a:endParaRPr lang="id-ID" dirty="0"/>
+                    </a:p>
+                  </a:txBody>
+                  <a:tcPr/>
+                </a:tc>
+                <a:extLst>
+                  <a:ext uri="{0D108BD9-81ED-4DB2-BD59-A6C34878D82A}">
+                    <a16:rowId xmlns:a16="http://schemas.microsoft.com/office/drawing/2014/main" val="1734004122"/>
+                  </a:ext>
+                </a:extLst>
+              </a:tr>
+              <a:tr h="370840">
+                <a:tc>
+                  <a:txBody>
+                    <a:bodyPr/>
+                    <a:lstStyle/>
+                    <a:p>
+                      <a:r>
+                        <a:rPr lang="en-US" dirty="0" err="1"/>
+                        <a:t>alphaTest</a:t>
+                      </a:r>
+                      <a:r>
+                        <a:rPr lang="en-US" dirty="0"/>
+                        <a:t> : Float</a:t>
+                      </a:r>
+                      <a:endParaRPr lang="id-ID" dirty="0"/>
+                    </a:p>
+                  </a:txBody>
+                  <a:tcPr/>
+                </a:tc>
+                <a:tc>
+                  <a:txBody>
+                    <a:bodyPr/>
+                    <a:lstStyle/>
+                    <a:p>
+                      <a:endParaRPr lang="id-ID"/>
+                    </a:p>
+                  </a:txBody>
+                  <a:tcPr/>
+                </a:tc>
+                <a:extLst>
+                  <a:ext uri="{0D108BD9-81ED-4DB2-BD59-A6C34878D82A}">
+                    <a16:rowId xmlns:a16="http://schemas.microsoft.com/office/drawing/2014/main" val="3849366304"/>
+                  </a:ext>
+                </a:extLst>
+              </a:tr>
+              <a:tr h="370840">
+                <a:tc>
+                  <a:txBody>
+                    <a:bodyPr/>
+                    <a:lstStyle/>
+                    <a:p>
+                      <a:r>
+                        <a:rPr lang="en-US" dirty="0" err="1"/>
+                        <a:t>blendDst</a:t>
+                      </a:r>
+                      <a:r>
+                        <a:rPr lang="en-US" dirty="0"/>
+                        <a:t> : Integer</a:t>
+                      </a:r>
+                      <a:endParaRPr lang="id-ID" dirty="0"/>
+                    </a:p>
+                  </a:txBody>
+                  <a:tcPr/>
+                </a:tc>
+                <a:tc>
+                  <a:txBody>
+                    <a:bodyPr/>
+                    <a:lstStyle/>
+                    <a:p>
+                      <a:endParaRPr lang="id-ID" dirty="0"/>
+                    </a:p>
+                  </a:txBody>
+                  <a:tcPr/>
+                </a:tc>
+                <a:extLst>
+                  <a:ext uri="{0D108BD9-81ED-4DB2-BD59-A6C34878D82A}">
+                    <a16:rowId xmlns:a16="http://schemas.microsoft.com/office/drawing/2014/main" val="3299357752"/>
+                  </a:ext>
+                </a:extLst>
+              </a:tr>
+              <a:tr h="370840">
+                <a:tc>
+                  <a:txBody>
+                    <a:bodyPr/>
+                    <a:lstStyle/>
+                    <a:p>
+                      <a:r>
+                        <a:rPr lang="en-US" dirty="0" err="1"/>
+                        <a:t>blendDstAlpha</a:t>
+                      </a:r>
+                      <a:r>
+                        <a:rPr lang="en-US" dirty="0"/>
+                        <a:t> : Integer</a:t>
+                      </a:r>
+                      <a:endParaRPr lang="id-ID" dirty="0"/>
+                    </a:p>
+                  </a:txBody>
+                  <a:tcPr/>
+                </a:tc>
+                <a:tc>
+                  <a:txBody>
+                    <a:bodyPr/>
+                    <a:lstStyle/>
+                    <a:p>
+                      <a:endParaRPr lang="id-ID" dirty="0"/>
+                    </a:p>
+                  </a:txBody>
+                  <a:tcPr/>
+                </a:tc>
+                <a:extLst>
+                  <a:ext uri="{0D108BD9-81ED-4DB2-BD59-A6C34878D82A}">
+                    <a16:rowId xmlns:a16="http://schemas.microsoft.com/office/drawing/2014/main" val="3959342427"/>
+                  </a:ext>
+                </a:extLst>
+              </a:tr>
+              <a:tr h="370840">
+                <a:tc>
+                  <a:txBody>
+                    <a:bodyPr/>
+                    <a:lstStyle/>
+                    <a:p>
+                      <a:r>
+                        <a:rPr lang="en-US" dirty="0" err="1"/>
+                        <a:t>blendEquation</a:t>
+                      </a:r>
+                      <a:r>
+                        <a:rPr lang="en-US" dirty="0"/>
+                        <a:t> : Integer</a:t>
+                      </a:r>
+                      <a:endParaRPr lang="id-ID" dirty="0"/>
+                    </a:p>
+                  </a:txBody>
+                  <a:tcPr/>
+                </a:tc>
+                <a:tc>
+                  <a:txBody>
+                    <a:bodyPr/>
+                    <a:lstStyle/>
+                    <a:p>
+                      <a:endParaRPr lang="id-ID" dirty="0"/>
+                    </a:p>
+                  </a:txBody>
+                  <a:tcPr/>
+                </a:tc>
+                <a:extLst>
+                  <a:ext uri="{0D108BD9-81ED-4DB2-BD59-A6C34878D82A}">
+                    <a16:rowId xmlns:a16="http://schemas.microsoft.com/office/drawing/2014/main" val="3937097117"/>
+                  </a:ext>
+                </a:extLst>
+              </a:tr>
+              <a:tr h="370840">
+                <a:tc>
+                  <a:txBody>
+                    <a:bodyPr/>
+                    <a:lstStyle/>
+                    <a:p>
+                      <a:r>
+                        <a:rPr lang="en-US" dirty="0" err="1"/>
+                        <a:t>blendEquationAlpha</a:t>
+                      </a:r>
+                      <a:r>
+                        <a:rPr lang="en-US" dirty="0"/>
+                        <a:t> : Integer</a:t>
+                      </a:r>
+                    </a:p>
+                  </a:txBody>
+                  <a:tcPr/>
+                </a:tc>
+                <a:tc>
+                  <a:txBody>
+                    <a:bodyPr/>
+                    <a:lstStyle/>
+                    <a:p>
+                      <a:endParaRPr lang="id-ID" dirty="0"/>
+                    </a:p>
+                  </a:txBody>
+                  <a:tcPr/>
+                </a:tc>
+                <a:extLst>
+                  <a:ext uri="{0D108BD9-81ED-4DB2-BD59-A6C34878D82A}">
+                    <a16:rowId xmlns:a16="http://schemas.microsoft.com/office/drawing/2014/main" val="3084465373"/>
+                  </a:ext>
+                </a:extLst>
+              </a:tr>
+              <a:tr h="370840">
+                <a:tc>
+                  <a:txBody>
+                    <a:bodyPr/>
+                    <a:lstStyle/>
+                    <a:p>
+                      <a:r>
+                        <a:rPr lang="en-US" dirty="0"/>
+                        <a:t>blending : Blending</a:t>
+                      </a:r>
+                      <a:endParaRPr lang="id-ID" dirty="0"/>
+                    </a:p>
+                  </a:txBody>
+                  <a:tcPr/>
+                </a:tc>
+                <a:tc>
+                  <a:txBody>
+                    <a:bodyPr/>
+                    <a:lstStyle/>
+                    <a:p>
+                      <a:endParaRPr lang="id-ID" dirty="0"/>
+                    </a:p>
+                  </a:txBody>
+                  <a:tcPr/>
+                </a:tc>
+                <a:extLst>
+                  <a:ext uri="{0D108BD9-81ED-4DB2-BD59-A6C34878D82A}">
+                    <a16:rowId xmlns:a16="http://schemas.microsoft.com/office/drawing/2014/main" val="2606312619"/>
+                  </a:ext>
+                </a:extLst>
+              </a:tr>
+              <a:tr h="370840">
+                <a:tc>
+                  <a:txBody>
+                    <a:bodyPr/>
+                    <a:lstStyle/>
+                    <a:p>
+                      <a:r>
+                        <a:rPr lang="en-US" dirty="0" err="1"/>
+                        <a:t>blendSrc</a:t>
+                      </a:r>
+                      <a:r>
+                        <a:rPr lang="en-US" dirty="0"/>
+                        <a:t> : Integer</a:t>
+                      </a:r>
+                      <a:endParaRPr lang="id-ID" dirty="0"/>
+                    </a:p>
+                  </a:txBody>
+                  <a:tcPr/>
+                </a:tc>
+                <a:tc>
+                  <a:txBody>
+                    <a:bodyPr/>
+                    <a:lstStyle/>
+                    <a:p>
+                      <a:endParaRPr lang="id-ID" dirty="0"/>
+                    </a:p>
+                  </a:txBody>
+                  <a:tcPr/>
+                </a:tc>
+                <a:extLst>
+                  <a:ext uri="{0D108BD9-81ED-4DB2-BD59-A6C34878D82A}">
+                    <a16:rowId xmlns:a16="http://schemas.microsoft.com/office/drawing/2014/main" val="1151933036"/>
+                  </a:ext>
+                </a:extLst>
+              </a:tr>
+              <a:tr h="370840">
+                <a:tc>
+                  <a:txBody>
+                    <a:bodyPr/>
+                    <a:lstStyle/>
+                    <a:p>
+                      <a:r>
+                        <a:rPr lang="en-US" dirty="0" err="1"/>
+                        <a:t>blendSrcAlpha</a:t>
+                      </a:r>
+                      <a:r>
+                        <a:rPr lang="en-US" dirty="0"/>
+                        <a:t> : Integer</a:t>
+                      </a:r>
+                      <a:endParaRPr lang="id-ID" dirty="0"/>
+                    </a:p>
+                  </a:txBody>
+                  <a:tcPr/>
+                </a:tc>
+                <a:tc>
+                  <a:txBody>
+                    <a:bodyPr/>
+                    <a:lstStyle/>
+                    <a:p>
+                      <a:endParaRPr lang="id-ID" dirty="0"/>
+                    </a:p>
+                  </a:txBody>
+                  <a:tcPr/>
+                </a:tc>
+                <a:extLst>
+                  <a:ext uri="{0D108BD9-81ED-4DB2-BD59-A6C34878D82A}">
+                    <a16:rowId xmlns:a16="http://schemas.microsoft.com/office/drawing/2014/main" val="3147889545"/>
+                  </a:ext>
+                </a:extLst>
+              </a:tr>
+              <a:tr h="370840">
+                <a:tc>
+                  <a:txBody>
+                    <a:bodyPr/>
+                    <a:lstStyle/>
+                    <a:p>
+                      <a:r>
+                        <a:rPr lang="en-US" dirty="0" err="1"/>
+                        <a:t>clipIntersection</a:t>
+                      </a:r>
+                      <a:endParaRPr lang="id-ID" dirty="0"/>
+                    </a:p>
+                  </a:txBody>
+                  <a:tcPr/>
+                </a:tc>
+                <a:tc>
+                  <a:txBody>
+                    <a:bodyPr/>
+                    <a:lstStyle/>
+                    <a:p>
+                      <a:endParaRPr lang="id-ID" dirty="0"/>
+                    </a:p>
+                  </a:txBody>
+                  <a:tcPr/>
+                </a:tc>
+                <a:extLst>
+                  <a:ext uri="{0D108BD9-81ED-4DB2-BD59-A6C34878D82A}">
+                    <a16:rowId xmlns:a16="http://schemas.microsoft.com/office/drawing/2014/main" val="360838315"/>
+                  </a:ext>
+                </a:extLst>
+              </a:tr>
+            </a:tbl>
+          </a:graphicData>
+        </a:graphic>
+      </p:graphicFrame>
+    </p:spTree>
+    <p:extLst>
+      <p:ext uri="{BB962C8B-B14F-4D97-AF65-F5344CB8AC3E}">
+        <p14:creationId xmlns:p14="http://schemas.microsoft.com/office/powerpoint/2010/main" val="2054443548"/>
+      </p:ext>
+    </p:extLst>
+  </p:cSld>
+  <p:clrMapOvr>
+    <a:masterClrMapping/>
+  </p:clrMapOvr>
+</p:sld>
+</file>
+
+<file path=ppt/slides/slide4.xml><?xml version="1.0" encoding="utf-8"?>
+<p:sld xmlns:a="http://schemas.openxmlformats.org/drawingml/2006/main" xmlns:r="http://schemas.openxmlformats.org/officeDocument/2006/relationships" xmlns:p="http://schemas.openxmlformats.org/presentationml/2006/main">
+  <p:cSld>
+    <p:spTree>
+      <p:nvGrpSpPr>
+        <p:cNvPr id="1" name=""/>
+        <p:cNvGrpSpPr/>
+        <p:nvPr/>
+      </p:nvGrpSpPr>
+      <p:grpSpPr>
+        <a:xfrm>
+          <a:off x="0" y="0"/>
+          <a:ext cx="0" cy="0"/>
+          <a:chOff x="0" y="0"/>
+          <a:chExt cx="0" cy="0"/>
+        </a:xfrm>
+      </p:grpSpPr>
+      <p:sp>
+        <p:nvSpPr>
+          <p:cNvPr id="2" name="Title 1">
+            <a:extLst>
+              <a:ext uri="{FF2B5EF4-FFF2-40B4-BE49-F238E27FC236}">
                 <a16:creationId xmlns:a16="http://schemas.microsoft.com/office/drawing/2014/main" id="{DE19492E-DF4A-454F-B899-A876D807D50C}"/>
               </a:ext>
             </a:extLst>
@@ -4507,12 +4965,12 @@
 </file>
 
 <file path=customXml/item1.xml><?xml version="1.0" encoding="utf-8"?>
-<?mso-contentType ?>
-<FormTemplates xmlns="http://schemas.microsoft.com/sharepoint/v3/contenttype/forms">
-  <Display>DocumentLibraryForm</Display>
-  <Edit>DocumentLibraryForm</Edit>
-  <New>DocumentLibraryForm</New>
-</FormTemplates>
+<p:properties xmlns:p="http://schemas.microsoft.com/office/2006/metadata/properties" xmlns:xsi="http://www.w3.org/2001/XMLSchema-instance" xmlns:pc="http://schemas.microsoft.com/office/infopath/2007/PartnerControls">
+  <documentManagement>
+    <Status xmlns="71af3243-3dd4-4a8d-8c0d-dd76da1f02a5">Not started</Status>
+    <MediaServiceKeyPoints xmlns="71af3243-3dd4-4a8d-8c0d-dd76da1f02a5" xsi:nil="true"/>
+  </documentManagement>
+</p:properties>
 </file>
 
 <file path=customXml/item2.xml><?xml version="1.0" encoding="utf-8"?>
@@ -4737,18 +5195,20 @@
 </file>
 
 <file path=customXml/item3.xml><?xml version="1.0" encoding="utf-8"?>
-<p:properties xmlns:p="http://schemas.microsoft.com/office/2006/metadata/properties" xmlns:xsi="http://www.w3.org/2001/XMLSchema-instance" xmlns:pc="http://schemas.microsoft.com/office/infopath/2007/PartnerControls">
-  <documentManagement>
-    <Status xmlns="71af3243-3dd4-4a8d-8c0d-dd76da1f02a5">Not started</Status>
-    <MediaServiceKeyPoints xmlns="71af3243-3dd4-4a8d-8c0d-dd76da1f02a5" xsi:nil="true"/>
-  </documentManagement>
-</p:properties>
+<?mso-contentType ?>
+<FormTemplates xmlns="http://schemas.microsoft.com/sharepoint/v3/contenttype/forms">
+  <Display>DocumentLibraryForm</Display>
+  <Edit>DocumentLibraryForm</Edit>
+  <New>DocumentLibraryForm</New>
+</FormTemplates>
 </file>
 
 <file path=customXml/itemProps1.xml><?xml version="1.0" encoding="utf-8"?>
-<ds:datastoreItem xmlns:ds="http://schemas.openxmlformats.org/officeDocument/2006/customXml" ds:itemID="{638A3B04-B0F3-4C12-A722-52B5CF6D9723}">
+<ds:datastoreItem xmlns:ds="http://schemas.openxmlformats.org/officeDocument/2006/customXml" ds:itemID="{4F5B1FD9-3BB6-4DA9-A089-3B68C2323D4F}">
   <ds:schemaRefs>
-    <ds:schemaRef ds:uri="http://schemas.microsoft.com/sharepoint/v3/contenttype/forms"/>
+    <ds:schemaRef ds:uri="http://schemas.microsoft.com/office/2006/metadata/properties"/>
+    <ds:schemaRef ds:uri="http://schemas.microsoft.com/office/infopath/2007/PartnerControls"/>
+    <ds:schemaRef ds:uri="71af3243-3dd4-4a8d-8c0d-dd76da1f02a5"/>
   </ds:schemaRefs>
 </ds:datastoreItem>
 </file>
@@ -4773,11 +5233,9 @@
 </file>
 
 <file path=customXml/itemProps3.xml><?xml version="1.0" encoding="utf-8"?>
-<ds:datastoreItem xmlns:ds="http://schemas.openxmlformats.org/officeDocument/2006/customXml" ds:itemID="{4F5B1FD9-3BB6-4DA9-A089-3B68C2323D4F}">
+<ds:datastoreItem xmlns:ds="http://schemas.openxmlformats.org/officeDocument/2006/customXml" ds:itemID="{638A3B04-B0F3-4C12-A722-52B5CF6D9723}">
   <ds:schemaRefs>
-    <ds:schemaRef ds:uri="http://schemas.microsoft.com/office/2006/metadata/properties"/>
-    <ds:schemaRef ds:uri="http://schemas.microsoft.com/office/infopath/2007/PartnerControls"/>
-    <ds:schemaRef ds:uri="71af3243-3dd4-4a8d-8c0d-dd76da1f02a5"/>
+    <ds:schemaRef ds:uri="http://schemas.microsoft.com/sharepoint/v3/contenttype/forms"/>
   </ds:schemaRefs>
 </ds:datastoreItem>
 </file>
</xml_diff>

<commit_message>
Revert "Merge branch 'master' of https://github.com/grafkom-2020/presentasi-threejs-grafkom-gang"
This reverts commit 145051a90be64b7d0e3ed084c1b24f782dfaa32d, reversing
changes made to a25cb3fd6b7df006a1e3336f4569abb486389989.
</commit_message>
<xml_diff>
--- a/documents/MATERIAL.pptx
+++ b/documents/MATERIAL.pptx
@@ -7,8 +7,15 @@
   <p:sldIdLst>
     <p:sldId id="268" r:id="rId5"/>
     <p:sldId id="310" r:id="rId6"/>
-    <p:sldId id="312" r:id="rId7"/>
-    <p:sldId id="311" r:id="rId8"/>
+    <p:sldId id="315" r:id="rId7"/>
+    <p:sldId id="318" r:id="rId8"/>
+    <p:sldId id="317" r:id="rId9"/>
+    <p:sldId id="316" r:id="rId10"/>
+    <p:sldId id="319" r:id="rId11"/>
+    <p:sldId id="320" r:id="rId12"/>
+    <p:sldId id="321" r:id="rId13"/>
+    <p:sldId id="312" r:id="rId14"/>
+    <p:sldId id="311" r:id="rId15"/>
   </p:sldIdLst>
   <p:sldSz cx="12192000" cy="6858000"/>
   <p:notesSz cx="6858000" cy="9144000"/>
@@ -3673,6 +3680,965 @@
 </p:sld>
 </file>
 
+<file path=ppt/slides/slide10.xml><?xml version="1.0" encoding="utf-8"?>
+<p:sld xmlns:a="http://schemas.openxmlformats.org/drawingml/2006/main" xmlns:r="http://schemas.openxmlformats.org/officeDocument/2006/relationships" xmlns:p="http://schemas.openxmlformats.org/presentationml/2006/main">
+  <p:cSld>
+    <p:spTree>
+      <p:nvGrpSpPr>
+        <p:cNvPr id="1" name=""/>
+        <p:cNvGrpSpPr/>
+        <p:nvPr/>
+      </p:nvGrpSpPr>
+      <p:grpSpPr>
+        <a:xfrm>
+          <a:off x="0" y="0"/>
+          <a:ext cx="0" cy="0"/>
+          <a:chOff x="0" y="0"/>
+          <a:chExt cx="0" cy="0"/>
+        </a:xfrm>
+      </p:grpSpPr>
+      <p:sp>
+        <p:nvSpPr>
+          <p:cNvPr id="2" name="Title 1">
+            <a:extLst>
+              <a:ext uri="{FF2B5EF4-FFF2-40B4-BE49-F238E27FC236}">
+                <a16:creationId xmlns:a16="http://schemas.microsoft.com/office/drawing/2014/main" id="{4EC0E574-6AAA-40CF-A3A9-5CBC00FBE6B6}"/>
+              </a:ext>
+            </a:extLst>
+          </p:cNvPr>
+          <p:cNvSpPr>
+            <a:spLocks noGrp="1"/>
+          </p:cNvSpPr>
+          <p:nvPr>
+            <p:ph type="title"/>
+          </p:nvPr>
+        </p:nvSpPr>
+        <p:spPr/>
+        <p:txBody>
+          <a:bodyPr/>
+          <a:lstStyle/>
+          <a:p>
+            <a:r>
+              <a:rPr lang="en-US" dirty="0" err="1"/>
+              <a:t>Properti</a:t>
+            </a:r>
+            <a:r>
+              <a:rPr lang="en-US" dirty="0"/>
+              <a:t> material </a:t>
+            </a:r>
+            <a:r>
+              <a:rPr lang="en-US" dirty="0" err="1"/>
+              <a:t>lainnya</a:t>
+            </a:r>
+            <a:endParaRPr lang="id-ID" dirty="0"/>
+          </a:p>
+        </p:txBody>
+      </p:sp>
+      <p:graphicFrame>
+        <p:nvGraphicFramePr>
+          <p:cNvPr id="6" name="Table 6">
+            <a:extLst>
+              <a:ext uri="{FF2B5EF4-FFF2-40B4-BE49-F238E27FC236}">
+                <a16:creationId xmlns:a16="http://schemas.microsoft.com/office/drawing/2014/main" id="{946BD124-7AD0-4E27-87B9-1CCD5AA5FDEB}"/>
+              </a:ext>
+            </a:extLst>
+          </p:cNvPr>
+          <p:cNvGraphicFramePr>
+            <a:graphicFrameLocks noGrp="1"/>
+          </p:cNvGraphicFramePr>
+          <p:nvPr>
+            <p:ph idx="1"/>
+            <p:extLst>
+              <p:ext uri="{D42A27DB-BD31-4B8C-83A1-F6EECF244321}">
+                <p14:modId xmlns:p14="http://schemas.microsoft.com/office/powerpoint/2010/main" val="1499792971"/>
+              </p:ext>
+            </p:extLst>
+          </p:nvPr>
+        </p:nvGraphicFramePr>
+        <p:xfrm>
+          <a:off x="1096963" y="2108200"/>
+          <a:ext cx="10058400" cy="4079240"/>
+        </p:xfrm>
+        <a:graphic>
+          <a:graphicData uri="http://schemas.openxmlformats.org/drawingml/2006/table">
+            <a:tbl>
+              <a:tblPr firstRow="1" bandRow="1">
+                <a:tableStyleId>{3B4B98B0-60AC-42C2-AFA5-B58CD77FA1E5}</a:tableStyleId>
+              </a:tblPr>
+              <a:tblGrid>
+                <a:gridCol w="5029200">
+                  <a:extLst>
+                    <a:ext uri="{9D8B030D-6E8A-4147-A177-3AD203B41FA5}">
+                      <a16:colId xmlns:a16="http://schemas.microsoft.com/office/drawing/2014/main" val="2874961603"/>
+                    </a:ext>
+                  </a:extLst>
+                </a:gridCol>
+                <a:gridCol w="5029200">
+                  <a:extLst>
+                    <a:ext uri="{9D8B030D-6E8A-4147-A177-3AD203B41FA5}">
+                      <a16:colId xmlns:a16="http://schemas.microsoft.com/office/drawing/2014/main" val="3748562219"/>
+                    </a:ext>
+                  </a:extLst>
+                </a:gridCol>
+              </a:tblGrid>
+              <a:tr h="370840">
+                <a:tc>
+                  <a:txBody>
+                    <a:bodyPr/>
+                    <a:lstStyle/>
+                    <a:p>
+                      <a:pPr algn="ctr"/>
+                      <a:r>
+                        <a:rPr lang="en-US" dirty="0" err="1"/>
+                        <a:t>Properti</a:t>
+                      </a:r>
+                      <a:endParaRPr lang="id-ID" dirty="0"/>
+                    </a:p>
+                  </a:txBody>
+                  <a:tcPr/>
+                </a:tc>
+                <a:tc>
+                  <a:txBody>
+                    <a:bodyPr/>
+                    <a:lstStyle/>
+                    <a:p>
+                      <a:pPr algn="ctr"/>
+                      <a:r>
+                        <a:rPr lang="en-US" dirty="0" err="1"/>
+                        <a:t>Fungsi</a:t>
+                      </a:r>
+                      <a:endParaRPr lang="id-ID" dirty="0"/>
+                    </a:p>
+                  </a:txBody>
+                  <a:tcPr/>
+                </a:tc>
+                <a:extLst>
+                  <a:ext uri="{0D108BD9-81ED-4DB2-BD59-A6C34878D82A}">
+                    <a16:rowId xmlns:a16="http://schemas.microsoft.com/office/drawing/2014/main" val="1734004122"/>
+                  </a:ext>
+                </a:extLst>
+              </a:tr>
+              <a:tr h="370840">
+                <a:tc>
+                  <a:txBody>
+                    <a:bodyPr/>
+                    <a:lstStyle/>
+                    <a:p>
+                      <a:r>
+                        <a:rPr lang="en-US" dirty="0" err="1"/>
+                        <a:t>alphaTest</a:t>
+                      </a:r>
+                      <a:r>
+                        <a:rPr lang="en-US" dirty="0"/>
+                        <a:t> : Float</a:t>
+                      </a:r>
+                      <a:endParaRPr lang="id-ID" dirty="0"/>
+                    </a:p>
+                  </a:txBody>
+                  <a:tcPr/>
+                </a:tc>
+                <a:tc>
+                  <a:txBody>
+                    <a:bodyPr/>
+                    <a:lstStyle/>
+                    <a:p>
+                      <a:r>
+                        <a:rPr lang="en-US" dirty="0"/>
+                        <a:t>Batas alpha </a:t>
+                      </a:r>
+                      <a:r>
+                        <a:rPr lang="en-US" dirty="0" err="1"/>
+                        <a:t>untuk</a:t>
+                      </a:r>
+                      <a:r>
+                        <a:rPr lang="en-US" dirty="0"/>
+                        <a:t> di-render</a:t>
+                      </a:r>
+                      <a:endParaRPr lang="id-ID" dirty="0"/>
+                    </a:p>
+                  </a:txBody>
+                  <a:tcPr/>
+                </a:tc>
+                <a:extLst>
+                  <a:ext uri="{0D108BD9-81ED-4DB2-BD59-A6C34878D82A}">
+                    <a16:rowId xmlns:a16="http://schemas.microsoft.com/office/drawing/2014/main" val="3849366304"/>
+                  </a:ext>
+                </a:extLst>
+              </a:tr>
+              <a:tr h="370840">
+                <a:tc>
+                  <a:txBody>
+                    <a:bodyPr/>
+                    <a:lstStyle/>
+                    <a:p>
+                      <a:pPr marL="0" marR="0" lvl="0" indent="0" algn="l" defTabSz="914400" rtl="0" eaLnBrk="1" fontAlgn="auto" latinLnBrk="0" hangingPunct="1">
+                        <a:lnSpc>
+                          <a:spcPct val="100000"/>
+                        </a:lnSpc>
+                        <a:spcBef>
+                          <a:spcPts val="0"/>
+                        </a:spcBef>
+                        <a:spcAft>
+                          <a:spcPts val="0"/>
+                        </a:spcAft>
+                        <a:buClrTx/>
+                        <a:buSzTx/>
+                        <a:buFontTx/>
+                        <a:buNone/>
+                        <a:tabLst/>
+                        <a:defRPr/>
+                      </a:pPr>
+                      <a:r>
+                        <a:rPr lang="en-US" dirty="0" err="1"/>
+                        <a:t>colorWrite</a:t>
+                      </a:r>
+                      <a:r>
+                        <a:rPr lang="en-US" dirty="0"/>
+                        <a:t> : Boolean</a:t>
+                      </a:r>
+                      <a:endParaRPr lang="id-ID" dirty="0"/>
+                    </a:p>
+                  </a:txBody>
+                  <a:tcPr/>
+                </a:tc>
+                <a:tc>
+                  <a:txBody>
+                    <a:bodyPr/>
+                    <a:lstStyle/>
+                    <a:p>
+                      <a:r>
+                        <a:rPr lang="en-US" dirty="0" err="1"/>
+                        <a:t>Apakah</a:t>
+                      </a:r>
+                      <a:r>
+                        <a:rPr lang="en-US" dirty="0"/>
+                        <a:t> </a:t>
+                      </a:r>
+                      <a:r>
+                        <a:rPr lang="en-US" dirty="0" err="1"/>
+                        <a:t>menulis</a:t>
+                      </a:r>
+                      <a:r>
+                        <a:rPr lang="en-US" dirty="0"/>
+                        <a:t> </a:t>
+                      </a:r>
+                      <a:r>
+                        <a:rPr lang="en-US" dirty="0" err="1"/>
+                        <a:t>ke</a:t>
+                      </a:r>
+                      <a:r>
+                        <a:rPr lang="en-US" dirty="0"/>
+                        <a:t> color buffer</a:t>
+                      </a:r>
+                      <a:endParaRPr lang="id-ID" dirty="0"/>
+                    </a:p>
+                  </a:txBody>
+                  <a:tcPr/>
+                </a:tc>
+                <a:extLst>
+                  <a:ext uri="{0D108BD9-81ED-4DB2-BD59-A6C34878D82A}">
+                    <a16:rowId xmlns:a16="http://schemas.microsoft.com/office/drawing/2014/main" val="3299357752"/>
+                  </a:ext>
+                </a:extLst>
+              </a:tr>
+              <a:tr h="370840">
+                <a:tc>
+                  <a:txBody>
+                    <a:bodyPr/>
+                    <a:lstStyle/>
+                    <a:p>
+                      <a:pPr marL="0" marR="0" lvl="0" indent="0" algn="l" defTabSz="914400" rtl="0" eaLnBrk="1" fontAlgn="auto" latinLnBrk="0" hangingPunct="1">
+                        <a:lnSpc>
+                          <a:spcPct val="100000"/>
+                        </a:lnSpc>
+                        <a:spcBef>
+                          <a:spcPts val="0"/>
+                        </a:spcBef>
+                        <a:spcAft>
+                          <a:spcPts val="0"/>
+                        </a:spcAft>
+                        <a:buClrTx/>
+                        <a:buSzTx/>
+                        <a:buFontTx/>
+                        <a:buNone/>
+                        <a:tabLst/>
+                        <a:defRPr/>
+                      </a:pPr>
+                      <a:r>
+                        <a:rPr lang="en-US" dirty="0"/>
+                        <a:t>defines : Object</a:t>
+                      </a:r>
+                      <a:endParaRPr lang="id-ID" dirty="0"/>
+                    </a:p>
+                  </a:txBody>
+                  <a:tcPr/>
+                </a:tc>
+                <a:tc>
+                  <a:txBody>
+                    <a:bodyPr/>
+                    <a:lstStyle/>
+                    <a:p>
+                      <a:r>
+                        <a:rPr lang="en-US" dirty="0" err="1"/>
+                        <a:t>Menambahkan</a:t>
+                      </a:r>
+                      <a:r>
+                        <a:rPr lang="en-US" dirty="0"/>
+                        <a:t> custom define </a:t>
+                      </a:r>
+                      <a:r>
+                        <a:rPr lang="en-US" dirty="0" err="1"/>
+                        <a:t>ke</a:t>
+                      </a:r>
+                      <a:r>
+                        <a:rPr lang="en-US" dirty="0"/>
+                        <a:t> shader</a:t>
+                      </a:r>
+                      <a:endParaRPr lang="id-ID" dirty="0"/>
+                    </a:p>
+                  </a:txBody>
+                  <a:tcPr/>
+                </a:tc>
+                <a:extLst>
+                  <a:ext uri="{0D108BD9-81ED-4DB2-BD59-A6C34878D82A}">
+                    <a16:rowId xmlns:a16="http://schemas.microsoft.com/office/drawing/2014/main" val="3959342427"/>
+                  </a:ext>
+                </a:extLst>
+              </a:tr>
+              <a:tr h="370840">
+                <a:tc>
+                  <a:txBody>
+                    <a:bodyPr/>
+                    <a:lstStyle/>
+                    <a:p>
+                      <a:pPr marL="0" marR="0" lvl="0" indent="0" algn="l" defTabSz="914400" rtl="0" eaLnBrk="1" fontAlgn="auto" latinLnBrk="0" hangingPunct="1">
+                        <a:lnSpc>
+                          <a:spcPct val="100000"/>
+                        </a:lnSpc>
+                        <a:spcBef>
+                          <a:spcPts val="0"/>
+                        </a:spcBef>
+                        <a:spcAft>
+                          <a:spcPts val="0"/>
+                        </a:spcAft>
+                        <a:buClrTx/>
+                        <a:buSzTx/>
+                        <a:buFontTx/>
+                        <a:buNone/>
+                        <a:tabLst/>
+                        <a:defRPr/>
+                      </a:pPr>
+                      <a:r>
+                        <a:rPr lang="en-US" dirty="0" err="1"/>
+                        <a:t>clipIntersection</a:t>
+                      </a:r>
+                      <a:r>
+                        <a:rPr lang="en-US" dirty="0"/>
+                        <a:t> : Boolean</a:t>
+                      </a:r>
+                      <a:endParaRPr lang="id-ID" dirty="0"/>
+                    </a:p>
+                  </a:txBody>
+                  <a:tcPr/>
+                </a:tc>
+                <a:tc>
+                  <a:txBody>
+                    <a:bodyPr/>
+                    <a:lstStyle/>
+                    <a:p>
+                      <a:r>
+                        <a:rPr lang="en-US" dirty="0" err="1"/>
+                        <a:t>Apakah</a:t>
+                      </a:r>
+                      <a:r>
+                        <a:rPr lang="en-US" dirty="0"/>
+                        <a:t> </a:t>
+                      </a:r>
+                      <a:r>
+                        <a:rPr lang="en-US" dirty="0" err="1"/>
+                        <a:t>menggunakan</a:t>
+                      </a:r>
+                      <a:r>
+                        <a:rPr lang="en-US" dirty="0"/>
+                        <a:t> custom clipping plane</a:t>
+                      </a:r>
+                      <a:endParaRPr lang="id-ID" dirty="0"/>
+                    </a:p>
+                  </a:txBody>
+                  <a:tcPr/>
+                </a:tc>
+                <a:extLst>
+                  <a:ext uri="{0D108BD9-81ED-4DB2-BD59-A6C34878D82A}">
+                    <a16:rowId xmlns:a16="http://schemas.microsoft.com/office/drawing/2014/main" val="3937097117"/>
+                  </a:ext>
+                </a:extLst>
+              </a:tr>
+              <a:tr h="370840">
+                <a:tc>
+                  <a:txBody>
+                    <a:bodyPr/>
+                    <a:lstStyle/>
+                    <a:p>
+                      <a:pPr marL="0" marR="0" lvl="0" indent="0" algn="l" defTabSz="914400" rtl="0" eaLnBrk="1" fontAlgn="auto" latinLnBrk="0" hangingPunct="1">
+                        <a:lnSpc>
+                          <a:spcPct val="100000"/>
+                        </a:lnSpc>
+                        <a:spcBef>
+                          <a:spcPts val="0"/>
+                        </a:spcBef>
+                        <a:spcAft>
+                          <a:spcPts val="0"/>
+                        </a:spcAft>
+                        <a:buClrTx/>
+                        <a:buSzTx/>
+                        <a:buFontTx/>
+                        <a:buNone/>
+                        <a:tabLst/>
+                        <a:defRPr/>
+                      </a:pPr>
+                      <a:r>
+                        <a:rPr lang="en-US"/>
+                        <a:t>clipShadows : Boolean</a:t>
+                      </a:r>
+                      <a:endParaRPr lang="id-ID" dirty="0"/>
+                    </a:p>
+                  </a:txBody>
+                  <a:tcPr/>
+                </a:tc>
+                <a:tc>
+                  <a:txBody>
+                    <a:bodyPr/>
+                    <a:lstStyle/>
+                    <a:p>
+                      <a:r>
+                        <a:rPr lang="en-US" dirty="0" err="1"/>
+                        <a:t>Apakah</a:t>
+                      </a:r>
+                      <a:r>
+                        <a:rPr lang="en-US" dirty="0"/>
+                        <a:t> </a:t>
+                      </a:r>
+                      <a:r>
+                        <a:rPr lang="en-US" dirty="0" err="1"/>
+                        <a:t>bayangan</a:t>
+                      </a:r>
+                      <a:r>
+                        <a:rPr lang="en-US" dirty="0"/>
+                        <a:t> </a:t>
+                      </a:r>
+                      <a:r>
+                        <a:rPr lang="en-US" dirty="0" err="1"/>
+                        <a:t>objek</a:t>
+                      </a:r>
+                      <a:r>
+                        <a:rPr lang="en-US" dirty="0"/>
+                        <a:t> </a:t>
+                      </a:r>
+                      <a:r>
+                        <a:rPr lang="en-US" dirty="0" err="1"/>
+                        <a:t>diklip</a:t>
+                      </a:r>
+                      <a:endParaRPr lang="id-ID" dirty="0"/>
+                    </a:p>
+                  </a:txBody>
+                  <a:tcPr/>
+                </a:tc>
+                <a:extLst>
+                  <a:ext uri="{0D108BD9-81ED-4DB2-BD59-A6C34878D82A}">
+                    <a16:rowId xmlns:a16="http://schemas.microsoft.com/office/drawing/2014/main" val="3084465373"/>
+                  </a:ext>
+                </a:extLst>
+              </a:tr>
+              <a:tr h="370840">
+                <a:tc>
+                  <a:txBody>
+                    <a:bodyPr/>
+                    <a:lstStyle/>
+                    <a:p>
+                      <a:pPr marL="0" marR="0" lvl="0" indent="0" algn="l" defTabSz="914400" rtl="0" eaLnBrk="1" fontAlgn="auto" latinLnBrk="0" hangingPunct="1">
+                        <a:lnSpc>
+                          <a:spcPct val="100000"/>
+                        </a:lnSpc>
+                        <a:spcBef>
+                          <a:spcPts val="0"/>
+                        </a:spcBef>
+                        <a:spcAft>
+                          <a:spcPts val="0"/>
+                        </a:spcAft>
+                        <a:buClrTx/>
+                        <a:buSzTx/>
+                        <a:buFontTx/>
+                        <a:buNone/>
+                        <a:tabLst/>
+                        <a:defRPr/>
+                      </a:pPr>
+                      <a:r>
+                        <a:rPr lang="en-US" dirty="0" err="1"/>
+                        <a:t>clippingPlanes</a:t>
+                      </a:r>
+                      <a:r>
+                        <a:rPr lang="en-US" dirty="0"/>
+                        <a:t> : Array</a:t>
+                      </a:r>
+                      <a:endParaRPr lang="id-ID" dirty="0"/>
+                    </a:p>
+                  </a:txBody>
+                  <a:tcPr/>
+                </a:tc>
+                <a:tc>
+                  <a:txBody>
+                    <a:bodyPr/>
+                    <a:lstStyle/>
+                    <a:p>
+                      <a:r>
+                        <a:rPr lang="en-US" dirty="0" err="1"/>
+                        <a:t>Mendefinisikan</a:t>
+                      </a:r>
+                      <a:r>
+                        <a:rPr lang="en-US" dirty="0"/>
+                        <a:t> clipping plane</a:t>
+                      </a:r>
+                      <a:endParaRPr lang="id-ID" dirty="0"/>
+                    </a:p>
+                  </a:txBody>
+                  <a:tcPr/>
+                </a:tc>
+                <a:extLst>
+                  <a:ext uri="{0D108BD9-81ED-4DB2-BD59-A6C34878D82A}">
+                    <a16:rowId xmlns:a16="http://schemas.microsoft.com/office/drawing/2014/main" val="2606312619"/>
+                  </a:ext>
+                </a:extLst>
+              </a:tr>
+              <a:tr h="370840">
+                <a:tc>
+                  <a:txBody>
+                    <a:bodyPr/>
+                    <a:lstStyle/>
+                    <a:p>
+                      <a:r>
+                        <a:rPr lang="en-US" dirty="0" err="1"/>
+                        <a:t>flatShading</a:t>
+                      </a:r>
+                      <a:r>
+                        <a:rPr lang="en-US" dirty="0"/>
+                        <a:t> : Boolean</a:t>
+                      </a:r>
+                      <a:endParaRPr lang="id-ID" dirty="0"/>
+                    </a:p>
+                  </a:txBody>
+                  <a:tcPr/>
+                </a:tc>
+                <a:tc>
+                  <a:txBody>
+                    <a:bodyPr/>
+                    <a:lstStyle/>
+                    <a:p>
+                      <a:r>
+                        <a:rPr lang="en-US" dirty="0" err="1"/>
+                        <a:t>Apakah</a:t>
+                      </a:r>
+                      <a:r>
+                        <a:rPr lang="en-US" dirty="0"/>
+                        <a:t> </a:t>
+                      </a:r>
+                      <a:r>
+                        <a:rPr lang="en-US" dirty="0" err="1"/>
+                        <a:t>dirender</a:t>
+                      </a:r>
+                      <a:r>
+                        <a:rPr lang="en-US" dirty="0"/>
+                        <a:t> </a:t>
+                      </a:r>
+                      <a:r>
+                        <a:rPr lang="en-US" dirty="0" err="1"/>
+                        <a:t>menggunakan</a:t>
+                      </a:r>
+                      <a:r>
+                        <a:rPr lang="en-US" dirty="0"/>
+                        <a:t> flat shading</a:t>
+                      </a:r>
+                      <a:endParaRPr lang="id-ID" dirty="0"/>
+                    </a:p>
+                  </a:txBody>
+                  <a:tcPr/>
+                </a:tc>
+                <a:extLst>
+                  <a:ext uri="{0D108BD9-81ED-4DB2-BD59-A6C34878D82A}">
+                    <a16:rowId xmlns:a16="http://schemas.microsoft.com/office/drawing/2014/main" val="1151933036"/>
+                  </a:ext>
+                </a:extLst>
+              </a:tr>
+              <a:tr h="370840">
+                <a:tc>
+                  <a:txBody>
+                    <a:bodyPr/>
+                    <a:lstStyle/>
+                    <a:p>
+                      <a:r>
+                        <a:rPr lang="en-US" dirty="0"/>
+                        <a:t>fog : Boolean</a:t>
+                      </a:r>
+                      <a:endParaRPr lang="id-ID" dirty="0"/>
+                    </a:p>
+                  </a:txBody>
+                  <a:tcPr/>
+                </a:tc>
+                <a:tc>
+                  <a:txBody>
+                    <a:bodyPr/>
+                    <a:lstStyle/>
+                    <a:p>
+                      <a:r>
+                        <a:rPr lang="en-US" dirty="0" err="1"/>
+                        <a:t>Apakah</a:t>
+                      </a:r>
+                      <a:r>
+                        <a:rPr lang="en-US" dirty="0"/>
+                        <a:t> material </a:t>
+                      </a:r>
+                      <a:r>
+                        <a:rPr lang="en-US" dirty="0" err="1"/>
+                        <a:t>dipengaruhi</a:t>
+                      </a:r>
+                      <a:r>
+                        <a:rPr lang="en-US" dirty="0"/>
+                        <a:t> oleh fog</a:t>
+                      </a:r>
+                      <a:endParaRPr lang="id-ID" dirty="0"/>
+                    </a:p>
+                  </a:txBody>
+                  <a:tcPr/>
+                </a:tc>
+                <a:extLst>
+                  <a:ext uri="{0D108BD9-81ED-4DB2-BD59-A6C34878D82A}">
+                    <a16:rowId xmlns:a16="http://schemas.microsoft.com/office/drawing/2014/main" val="3147889545"/>
+                  </a:ext>
+                </a:extLst>
+              </a:tr>
+              <a:tr h="370840">
+                <a:tc>
+                  <a:txBody>
+                    <a:bodyPr/>
+                    <a:lstStyle/>
+                    <a:p>
+                      <a:r>
+                        <a:rPr lang="en-US" dirty="0"/>
+                        <a:t>Transparent : Boolean</a:t>
+                      </a:r>
+                      <a:endParaRPr lang="id-ID" dirty="0"/>
+                    </a:p>
+                  </a:txBody>
+                  <a:tcPr/>
+                </a:tc>
+                <a:tc>
+                  <a:txBody>
+                    <a:bodyPr/>
+                    <a:lstStyle/>
+                    <a:p>
+                      <a:r>
+                        <a:rPr lang="en-US" dirty="0" err="1"/>
+                        <a:t>Apakah</a:t>
+                      </a:r>
+                      <a:r>
+                        <a:rPr lang="en-US" dirty="0"/>
+                        <a:t> material </a:t>
+                      </a:r>
+                      <a:r>
+                        <a:rPr lang="en-US" dirty="0" err="1"/>
+                        <a:t>transpara</a:t>
+                      </a:r>
+                      <a:endParaRPr lang="id-ID" dirty="0"/>
+                    </a:p>
+                  </a:txBody>
+                  <a:tcPr/>
+                </a:tc>
+                <a:extLst>
+                  <a:ext uri="{0D108BD9-81ED-4DB2-BD59-A6C34878D82A}">
+                    <a16:rowId xmlns:a16="http://schemas.microsoft.com/office/drawing/2014/main" val="915076493"/>
+                  </a:ext>
+                </a:extLst>
+              </a:tr>
+              <a:tr h="370840">
+                <a:tc>
+                  <a:txBody>
+                    <a:bodyPr/>
+                    <a:lstStyle/>
+                    <a:p>
+                      <a:r>
+                        <a:rPr lang="en-US" dirty="0"/>
+                        <a:t>opacity : Float</a:t>
+                      </a:r>
+                      <a:endParaRPr lang="id-ID" dirty="0"/>
+                    </a:p>
+                  </a:txBody>
+                  <a:tcPr/>
+                </a:tc>
+                <a:tc>
+                  <a:txBody>
+                    <a:bodyPr/>
+                    <a:lstStyle/>
+                    <a:p>
+                      <a:r>
+                        <a:rPr lang="en-US" dirty="0" err="1"/>
+                        <a:t>Seperapa</a:t>
+                      </a:r>
+                      <a:r>
+                        <a:rPr lang="en-US" dirty="0"/>
+                        <a:t> </a:t>
+                      </a:r>
+                      <a:r>
+                        <a:rPr lang="en-US" dirty="0" err="1"/>
+                        <a:t>transparan</a:t>
+                      </a:r>
+                      <a:r>
+                        <a:rPr lang="en-US" dirty="0"/>
+                        <a:t> material</a:t>
+                      </a:r>
+                      <a:endParaRPr lang="id-ID" dirty="0"/>
+                    </a:p>
+                  </a:txBody>
+                  <a:tcPr/>
+                </a:tc>
+                <a:extLst>
+                  <a:ext uri="{0D108BD9-81ED-4DB2-BD59-A6C34878D82A}">
+                    <a16:rowId xmlns:a16="http://schemas.microsoft.com/office/drawing/2014/main" val="360838315"/>
+                  </a:ext>
+                </a:extLst>
+              </a:tr>
+            </a:tbl>
+          </a:graphicData>
+        </a:graphic>
+      </p:graphicFrame>
+    </p:spTree>
+    <p:extLst>
+      <p:ext uri="{BB962C8B-B14F-4D97-AF65-F5344CB8AC3E}">
+        <p14:creationId xmlns:p14="http://schemas.microsoft.com/office/powerpoint/2010/main" val="2054443548"/>
+      </p:ext>
+    </p:extLst>
+  </p:cSld>
+  <p:clrMapOvr>
+    <a:masterClrMapping/>
+  </p:clrMapOvr>
+</p:sld>
+</file>
+
+<file path=ppt/slides/slide11.xml><?xml version="1.0" encoding="utf-8"?>
+<p:sld xmlns:a="http://schemas.openxmlformats.org/drawingml/2006/main" xmlns:r="http://schemas.openxmlformats.org/officeDocument/2006/relationships" xmlns:p="http://schemas.openxmlformats.org/presentationml/2006/main">
+  <p:cSld>
+    <p:spTree>
+      <p:nvGrpSpPr>
+        <p:cNvPr id="1" name=""/>
+        <p:cNvGrpSpPr/>
+        <p:nvPr/>
+      </p:nvGrpSpPr>
+      <p:grpSpPr>
+        <a:xfrm>
+          <a:off x="0" y="0"/>
+          <a:ext cx="0" cy="0"/>
+          <a:chOff x="0" y="0"/>
+          <a:chExt cx="0" cy="0"/>
+        </a:xfrm>
+      </p:grpSpPr>
+      <p:sp>
+        <p:nvSpPr>
+          <p:cNvPr id="2" name="Title 1">
+            <a:extLst>
+              <a:ext uri="{FF2B5EF4-FFF2-40B4-BE49-F238E27FC236}">
+                <a16:creationId xmlns:a16="http://schemas.microsoft.com/office/drawing/2014/main" id="{DE19492E-DF4A-454F-B899-A876D807D50C}"/>
+              </a:ext>
+            </a:extLst>
+          </p:cNvPr>
+          <p:cNvSpPr>
+            <a:spLocks noGrp="1"/>
+          </p:cNvSpPr>
+          <p:nvPr>
+            <p:ph type="title"/>
+          </p:nvPr>
+        </p:nvSpPr>
+        <p:spPr/>
+        <p:txBody>
+          <a:bodyPr/>
+          <a:lstStyle/>
+          <a:p>
+            <a:r>
+              <a:rPr lang="en-US" dirty="0" err="1"/>
+              <a:t>Jenis</a:t>
+            </a:r>
+            <a:r>
+              <a:rPr lang="en-US" dirty="0"/>
+              <a:t> </a:t>
+            </a:r>
+            <a:r>
+              <a:rPr lang="en-US" dirty="0" err="1"/>
+              <a:t>jenis</a:t>
+            </a:r>
+            <a:r>
+              <a:rPr lang="en-US" dirty="0"/>
+              <a:t> material</a:t>
+            </a:r>
+            <a:endParaRPr lang="id-ID" dirty="0"/>
+          </a:p>
+        </p:txBody>
+      </p:sp>
+      <p:sp>
+        <p:nvSpPr>
+          <p:cNvPr id="3" name="Content Placeholder 2">
+            <a:extLst>
+              <a:ext uri="{FF2B5EF4-FFF2-40B4-BE49-F238E27FC236}">
+                <a16:creationId xmlns:a16="http://schemas.microsoft.com/office/drawing/2014/main" id="{F14EB4D7-AF39-4D02-BF97-FB815035A065}"/>
+              </a:ext>
+            </a:extLst>
+          </p:cNvPr>
+          <p:cNvSpPr>
+            <a:spLocks noGrp="1"/>
+          </p:cNvSpPr>
+          <p:nvPr>
+            <p:ph idx="1"/>
+          </p:nvPr>
+        </p:nvSpPr>
+        <p:spPr/>
+        <p:txBody>
+          <a:bodyPr numCol="2"/>
+          <a:lstStyle/>
+          <a:p>
+            <a:pPr>
+              <a:buFont typeface="Arial" panose="020B0604020202020204" pitchFamily="34" charset="0"/>
+              <a:buChar char="•"/>
+            </a:pPr>
+            <a:r>
+              <a:rPr lang="en-US" dirty="0" err="1"/>
+              <a:t>MeshBasicMaterial</a:t>
+            </a:r>
+            <a:endParaRPr lang="en-US" dirty="0"/>
+          </a:p>
+          <a:p>
+            <a:pPr>
+              <a:buFont typeface="Arial" panose="020B0604020202020204" pitchFamily="34" charset="0"/>
+              <a:buChar char="•"/>
+            </a:pPr>
+            <a:r>
+              <a:rPr lang="en-US" dirty="0" err="1"/>
+              <a:t>MeshNormalMaterial</a:t>
+            </a:r>
+            <a:endParaRPr lang="en-US" dirty="0"/>
+          </a:p>
+          <a:p>
+            <a:pPr>
+              <a:buFont typeface="Arial" panose="020B0604020202020204" pitchFamily="34" charset="0"/>
+              <a:buChar char="•"/>
+            </a:pPr>
+            <a:r>
+              <a:rPr lang="en-US" dirty="0" err="1"/>
+              <a:t>MeshLambertMaterial</a:t>
+            </a:r>
+            <a:endParaRPr lang="en-US" dirty="0"/>
+          </a:p>
+          <a:p>
+            <a:pPr>
+              <a:buFont typeface="Arial" panose="020B0604020202020204" pitchFamily="34" charset="0"/>
+              <a:buChar char="•"/>
+            </a:pPr>
+            <a:r>
+              <a:rPr lang="en-US" dirty="0" err="1"/>
+              <a:t>MeshPhongMaterial</a:t>
+            </a:r>
+            <a:endParaRPr lang="en-US" dirty="0"/>
+          </a:p>
+          <a:p>
+            <a:pPr>
+              <a:buFont typeface="Arial" panose="020B0604020202020204" pitchFamily="34" charset="0"/>
+              <a:buChar char="•"/>
+            </a:pPr>
+            <a:r>
+              <a:rPr lang="en-US" dirty="0" err="1"/>
+              <a:t>MeshStandardMaterial</a:t>
+            </a:r>
+            <a:endParaRPr lang="en-US" dirty="0"/>
+          </a:p>
+          <a:p>
+            <a:pPr>
+              <a:buFont typeface="Arial" panose="020B0604020202020204" pitchFamily="34" charset="0"/>
+              <a:buChar char="•"/>
+            </a:pPr>
+            <a:endParaRPr lang="en-US" dirty="0"/>
+          </a:p>
+          <a:p>
+            <a:pPr>
+              <a:buFont typeface="Arial" panose="020B0604020202020204" pitchFamily="34" charset="0"/>
+              <a:buChar char="•"/>
+            </a:pPr>
+            <a:endParaRPr lang="en-US" dirty="0"/>
+          </a:p>
+          <a:p>
+            <a:pPr>
+              <a:buFont typeface="Arial" panose="020B0604020202020204" pitchFamily="34" charset="0"/>
+              <a:buChar char="•"/>
+            </a:pPr>
+            <a:r>
+              <a:rPr lang="en-US" dirty="0" err="1"/>
+              <a:t>LineBasicMaterial</a:t>
+            </a:r>
+            <a:endParaRPr lang="en-US" dirty="0"/>
+          </a:p>
+          <a:p>
+            <a:pPr>
+              <a:buFont typeface="Arial" panose="020B0604020202020204" pitchFamily="34" charset="0"/>
+              <a:buChar char="•"/>
+            </a:pPr>
+            <a:r>
+              <a:rPr lang="en-US" dirty="0" err="1"/>
+              <a:t>MeshDepthMaterial</a:t>
+            </a:r>
+            <a:endParaRPr lang="en-US" dirty="0"/>
+          </a:p>
+          <a:p>
+            <a:pPr>
+              <a:buFont typeface="Arial" panose="020B0604020202020204" pitchFamily="34" charset="0"/>
+              <a:buChar char="•"/>
+            </a:pPr>
+            <a:r>
+              <a:rPr lang="en-US" dirty="0" err="1"/>
+              <a:t>LineDashedMaterial</a:t>
+            </a:r>
+            <a:endParaRPr lang="en-US" dirty="0"/>
+          </a:p>
+          <a:p>
+            <a:pPr>
+              <a:buFont typeface="Arial" panose="020B0604020202020204" pitchFamily="34" charset="0"/>
+              <a:buChar char="•"/>
+            </a:pPr>
+            <a:r>
+              <a:rPr lang="en-US" dirty="0" err="1"/>
+              <a:t>PointsMaterial</a:t>
+            </a:r>
+            <a:endParaRPr lang="en-US" dirty="0"/>
+          </a:p>
+          <a:p>
+            <a:pPr>
+              <a:buFont typeface="Arial" panose="020B0604020202020204" pitchFamily="34" charset="0"/>
+              <a:buChar char="•"/>
+            </a:pPr>
+            <a:r>
+              <a:rPr lang="en-US" dirty="0" err="1"/>
+              <a:t>SpriteMaterial</a:t>
+            </a:r>
+            <a:endParaRPr lang="id-ID" dirty="0"/>
+          </a:p>
+        </p:txBody>
+      </p:sp>
+    </p:spTree>
+    <p:extLst>
+      <p:ext uri="{BB962C8B-B14F-4D97-AF65-F5344CB8AC3E}">
+        <p14:creationId xmlns:p14="http://schemas.microsoft.com/office/powerpoint/2010/main" val="583858924"/>
+      </p:ext>
+    </p:extLst>
+  </p:cSld>
+  <p:clrMapOvr>
+    <a:masterClrMapping/>
+  </p:clrMapOvr>
+</p:sld>
+</file>
+
 <file path=ppt/slides/slide2.xml><?xml version="1.0" encoding="utf-8"?>
 <p:sld xmlns:a="http://schemas.openxmlformats.org/drawingml/2006/main" xmlns:r="http://schemas.openxmlformats.org/officeDocument/2006/relationships" xmlns:p="http://schemas.openxmlformats.org/presentationml/2006/main">
   <p:cSld>
@@ -3943,7 +4909,7 @@
           <p:cNvPr id="2" name="Title 1">
             <a:extLst>
               <a:ext uri="{FF2B5EF4-FFF2-40B4-BE49-F238E27FC236}">
-                <a16:creationId xmlns:a16="http://schemas.microsoft.com/office/drawing/2014/main" id="{4EC0E574-6AAA-40CF-A3A9-5CBC00FBE6B6}"/>
+                <a16:creationId xmlns:a16="http://schemas.microsoft.com/office/drawing/2014/main" id="{6D5332B5-CB83-44F7-B9B9-642BE1402AF5}"/>
               </a:ext>
             </a:extLst>
           </p:cNvPr>
@@ -3960,415 +4926,167 @@
           <a:lstStyle/>
           <a:p>
             <a:r>
-              <a:rPr lang="en-US" dirty="0" err="1"/>
-              <a:t>Properti</a:t>
-            </a:r>
-            <a:r>
-              <a:rPr lang="en-US" dirty="0"/>
-              <a:t> material</a:t>
+              <a:rPr lang="en-US" dirty="0"/>
+              <a:t>Blending dan color buffer</a:t>
             </a:r>
             <a:endParaRPr lang="id-ID" dirty="0"/>
           </a:p>
         </p:txBody>
       </p:sp>
-      <p:graphicFrame>
-        <p:nvGraphicFramePr>
-          <p:cNvPr id="6" name="Table 6">
+      <p:sp>
+        <p:nvSpPr>
+          <p:cNvPr id="3" name="Content Placeholder 2">
             <a:extLst>
               <a:ext uri="{FF2B5EF4-FFF2-40B4-BE49-F238E27FC236}">
-                <a16:creationId xmlns:a16="http://schemas.microsoft.com/office/drawing/2014/main" id="{946BD124-7AD0-4E27-87B9-1CCD5AA5FDEB}"/>
+                <a16:creationId xmlns:a16="http://schemas.microsoft.com/office/drawing/2014/main" id="{25DD0896-AC0D-4AE6-994E-6D7DC8DF3B73}"/>
               </a:ext>
             </a:extLst>
           </p:cNvPr>
-          <p:cNvGraphicFramePr>
-            <a:graphicFrameLocks noGrp="1"/>
-          </p:cNvGraphicFramePr>
+          <p:cNvSpPr>
+            <a:spLocks noGrp="1"/>
+          </p:cNvSpPr>
           <p:nvPr>
             <p:ph idx="1"/>
-            <p:extLst>
-              <p:ext uri="{D42A27DB-BD31-4B8C-83A1-F6EECF244321}">
-                <p14:modId xmlns:p14="http://schemas.microsoft.com/office/powerpoint/2010/main" val="1844837504"/>
-              </p:ext>
-            </p:extLst>
           </p:nvPr>
-        </p:nvGraphicFramePr>
-        <p:xfrm>
-          <a:off x="1096963" y="2108200"/>
-          <a:ext cx="10058400" cy="3708400"/>
-        </p:xfrm>
-        <a:graphic>
-          <a:graphicData uri="http://schemas.openxmlformats.org/drawingml/2006/table">
-            <a:tbl>
-              <a:tblPr firstRow="1" bandRow="1">
-                <a:tableStyleId>{3B4B98B0-60AC-42C2-AFA5-B58CD77FA1E5}</a:tableStyleId>
-              </a:tblPr>
-              <a:tblGrid>
-                <a:gridCol w="5029200">
-                  <a:extLst>
-                    <a:ext uri="{9D8B030D-6E8A-4147-A177-3AD203B41FA5}">
-                      <a16:colId xmlns:a16="http://schemas.microsoft.com/office/drawing/2014/main" val="2874961603"/>
-                    </a:ext>
-                  </a:extLst>
-                </a:gridCol>
-                <a:gridCol w="5029200">
-                  <a:extLst>
-                    <a:ext uri="{9D8B030D-6E8A-4147-A177-3AD203B41FA5}">
-                      <a16:colId xmlns:a16="http://schemas.microsoft.com/office/drawing/2014/main" val="3748562219"/>
-                    </a:ext>
-                  </a:extLst>
-                </a:gridCol>
-              </a:tblGrid>
-              <a:tr h="370840">
-                <a:tc>
-                  <a:txBody>
-                    <a:bodyPr/>
-                    <a:lstStyle/>
-                    <a:p>
-                      <a:pPr algn="ctr"/>
-                      <a:r>
-                        <a:rPr lang="en-US" dirty="0" err="1"/>
-                        <a:t>Properti</a:t>
-                      </a:r>
-                      <a:endParaRPr lang="id-ID" dirty="0"/>
-                    </a:p>
-                  </a:txBody>
-                  <a:tcPr/>
-                </a:tc>
-                <a:tc>
-                  <a:txBody>
-                    <a:bodyPr/>
-                    <a:lstStyle/>
-                    <a:p>
-                      <a:pPr algn="ctr"/>
-                      <a:r>
-                        <a:rPr lang="en-US" dirty="0" err="1"/>
-                        <a:t>Fungsi</a:t>
-                      </a:r>
-                      <a:endParaRPr lang="id-ID" dirty="0"/>
-                    </a:p>
-                  </a:txBody>
-                  <a:tcPr/>
-                </a:tc>
-                <a:extLst>
-                  <a:ext uri="{0D108BD9-81ED-4DB2-BD59-A6C34878D82A}">
-                    <a16:rowId xmlns:a16="http://schemas.microsoft.com/office/drawing/2014/main" val="1734004122"/>
-                  </a:ext>
-                </a:extLst>
-              </a:tr>
-              <a:tr h="370840">
-                <a:tc>
-                  <a:txBody>
-                    <a:bodyPr/>
-                    <a:lstStyle/>
-                    <a:p>
-                      <a:r>
-                        <a:rPr lang="en-US" dirty="0" err="1"/>
-                        <a:t>alphaTest</a:t>
-                      </a:r>
-                      <a:r>
-                        <a:rPr lang="en-US" dirty="0"/>
-                        <a:t> : Float</a:t>
-                      </a:r>
-                      <a:endParaRPr lang="id-ID" dirty="0"/>
-                    </a:p>
-                  </a:txBody>
-                  <a:tcPr/>
-                </a:tc>
-                <a:tc>
-                  <a:txBody>
-                    <a:bodyPr/>
-                    <a:lstStyle/>
-                    <a:p>
-                      <a:endParaRPr lang="id-ID"/>
-                    </a:p>
-                  </a:txBody>
-                  <a:tcPr/>
-                </a:tc>
-                <a:extLst>
-                  <a:ext uri="{0D108BD9-81ED-4DB2-BD59-A6C34878D82A}">
-                    <a16:rowId xmlns:a16="http://schemas.microsoft.com/office/drawing/2014/main" val="3849366304"/>
-                  </a:ext>
-                </a:extLst>
-              </a:tr>
-              <a:tr h="370840">
-                <a:tc>
-                  <a:txBody>
-                    <a:bodyPr/>
-                    <a:lstStyle/>
-                    <a:p>
-                      <a:r>
-                        <a:rPr lang="en-US" dirty="0" err="1"/>
-                        <a:t>blendDst</a:t>
-                      </a:r>
-                      <a:r>
-                        <a:rPr lang="en-US" dirty="0"/>
-                        <a:t> : Integer</a:t>
-                      </a:r>
-                      <a:endParaRPr lang="id-ID" dirty="0"/>
-                    </a:p>
-                  </a:txBody>
-                  <a:tcPr/>
-                </a:tc>
-                <a:tc>
-                  <a:txBody>
-                    <a:bodyPr/>
-                    <a:lstStyle/>
-                    <a:p>
-                      <a:endParaRPr lang="id-ID" dirty="0"/>
-                    </a:p>
-                  </a:txBody>
-                  <a:tcPr/>
-                </a:tc>
-                <a:extLst>
-                  <a:ext uri="{0D108BD9-81ED-4DB2-BD59-A6C34878D82A}">
-                    <a16:rowId xmlns:a16="http://schemas.microsoft.com/office/drawing/2014/main" val="3299357752"/>
-                  </a:ext>
-                </a:extLst>
-              </a:tr>
-              <a:tr h="370840">
-                <a:tc>
-                  <a:txBody>
-                    <a:bodyPr/>
-                    <a:lstStyle/>
-                    <a:p>
-                      <a:r>
-                        <a:rPr lang="en-US" dirty="0" err="1"/>
-                        <a:t>blendDstAlpha</a:t>
-                      </a:r>
-                      <a:r>
-                        <a:rPr lang="en-US" dirty="0"/>
-                        <a:t> : Integer</a:t>
-                      </a:r>
-                      <a:endParaRPr lang="id-ID" dirty="0"/>
-                    </a:p>
-                  </a:txBody>
-                  <a:tcPr/>
-                </a:tc>
-                <a:tc>
-                  <a:txBody>
-                    <a:bodyPr/>
-                    <a:lstStyle/>
-                    <a:p>
-                      <a:endParaRPr lang="id-ID" dirty="0"/>
-                    </a:p>
-                  </a:txBody>
-                  <a:tcPr/>
-                </a:tc>
-                <a:extLst>
-                  <a:ext uri="{0D108BD9-81ED-4DB2-BD59-A6C34878D82A}">
-                    <a16:rowId xmlns:a16="http://schemas.microsoft.com/office/drawing/2014/main" val="3959342427"/>
-                  </a:ext>
-                </a:extLst>
-              </a:tr>
-              <a:tr h="370840">
-                <a:tc>
-                  <a:txBody>
-                    <a:bodyPr/>
-                    <a:lstStyle/>
-                    <a:p>
-                      <a:r>
-                        <a:rPr lang="en-US" dirty="0" err="1"/>
-                        <a:t>blendEquation</a:t>
-                      </a:r>
-                      <a:r>
-                        <a:rPr lang="en-US" dirty="0"/>
-                        <a:t> : Integer</a:t>
-                      </a:r>
-                      <a:endParaRPr lang="id-ID" dirty="0"/>
-                    </a:p>
-                  </a:txBody>
-                  <a:tcPr/>
-                </a:tc>
-                <a:tc>
-                  <a:txBody>
-                    <a:bodyPr/>
-                    <a:lstStyle/>
-                    <a:p>
-                      <a:endParaRPr lang="id-ID" dirty="0"/>
-                    </a:p>
-                  </a:txBody>
-                  <a:tcPr/>
-                </a:tc>
-                <a:extLst>
-                  <a:ext uri="{0D108BD9-81ED-4DB2-BD59-A6C34878D82A}">
-                    <a16:rowId xmlns:a16="http://schemas.microsoft.com/office/drawing/2014/main" val="3937097117"/>
-                  </a:ext>
-                </a:extLst>
-              </a:tr>
-              <a:tr h="370840">
-                <a:tc>
-                  <a:txBody>
-                    <a:bodyPr/>
-                    <a:lstStyle/>
-                    <a:p>
-                      <a:r>
-                        <a:rPr lang="en-US" dirty="0" err="1"/>
-                        <a:t>blendEquationAlpha</a:t>
-                      </a:r>
-                      <a:r>
-                        <a:rPr lang="en-US" dirty="0"/>
-                        <a:t> : Integer</a:t>
-                      </a:r>
-                    </a:p>
-                  </a:txBody>
-                  <a:tcPr/>
-                </a:tc>
-                <a:tc>
-                  <a:txBody>
-                    <a:bodyPr/>
-                    <a:lstStyle/>
-                    <a:p>
-                      <a:endParaRPr lang="id-ID" dirty="0"/>
-                    </a:p>
-                  </a:txBody>
-                  <a:tcPr/>
-                </a:tc>
-                <a:extLst>
-                  <a:ext uri="{0D108BD9-81ED-4DB2-BD59-A6C34878D82A}">
-                    <a16:rowId xmlns:a16="http://schemas.microsoft.com/office/drawing/2014/main" val="3084465373"/>
-                  </a:ext>
-                </a:extLst>
-              </a:tr>
-              <a:tr h="370840">
-                <a:tc>
-                  <a:txBody>
-                    <a:bodyPr/>
-                    <a:lstStyle/>
-                    <a:p>
-                      <a:r>
-                        <a:rPr lang="en-US" dirty="0"/>
-                        <a:t>blending : Blending</a:t>
-                      </a:r>
-                      <a:endParaRPr lang="id-ID" dirty="0"/>
-                    </a:p>
-                  </a:txBody>
-                  <a:tcPr/>
-                </a:tc>
-                <a:tc>
-                  <a:txBody>
-                    <a:bodyPr/>
-                    <a:lstStyle/>
-                    <a:p>
-                      <a:endParaRPr lang="id-ID" dirty="0"/>
-                    </a:p>
-                  </a:txBody>
-                  <a:tcPr/>
-                </a:tc>
-                <a:extLst>
-                  <a:ext uri="{0D108BD9-81ED-4DB2-BD59-A6C34878D82A}">
-                    <a16:rowId xmlns:a16="http://schemas.microsoft.com/office/drawing/2014/main" val="2606312619"/>
-                  </a:ext>
-                </a:extLst>
-              </a:tr>
-              <a:tr h="370840">
-                <a:tc>
-                  <a:txBody>
-                    <a:bodyPr/>
-                    <a:lstStyle/>
-                    <a:p>
-                      <a:r>
-                        <a:rPr lang="en-US" dirty="0" err="1"/>
-                        <a:t>blendSrc</a:t>
-                      </a:r>
-                      <a:r>
-                        <a:rPr lang="en-US" dirty="0"/>
-                        <a:t> : Integer</a:t>
-                      </a:r>
-                      <a:endParaRPr lang="id-ID" dirty="0"/>
-                    </a:p>
-                  </a:txBody>
-                  <a:tcPr/>
-                </a:tc>
-                <a:tc>
-                  <a:txBody>
-                    <a:bodyPr/>
-                    <a:lstStyle/>
-                    <a:p>
-                      <a:endParaRPr lang="id-ID" dirty="0"/>
-                    </a:p>
-                  </a:txBody>
-                  <a:tcPr/>
-                </a:tc>
-                <a:extLst>
-                  <a:ext uri="{0D108BD9-81ED-4DB2-BD59-A6C34878D82A}">
-                    <a16:rowId xmlns:a16="http://schemas.microsoft.com/office/drawing/2014/main" val="1151933036"/>
-                  </a:ext>
-                </a:extLst>
-              </a:tr>
-              <a:tr h="370840">
-                <a:tc>
-                  <a:txBody>
-                    <a:bodyPr/>
-                    <a:lstStyle/>
-                    <a:p>
-                      <a:r>
-                        <a:rPr lang="en-US" dirty="0" err="1"/>
-                        <a:t>blendSrcAlpha</a:t>
-                      </a:r>
-                      <a:r>
-                        <a:rPr lang="en-US" dirty="0"/>
-                        <a:t> : Integer</a:t>
-                      </a:r>
-                      <a:endParaRPr lang="id-ID" dirty="0"/>
-                    </a:p>
-                  </a:txBody>
-                  <a:tcPr/>
-                </a:tc>
-                <a:tc>
-                  <a:txBody>
-                    <a:bodyPr/>
-                    <a:lstStyle/>
-                    <a:p>
-                      <a:endParaRPr lang="id-ID" dirty="0"/>
-                    </a:p>
-                  </a:txBody>
-                  <a:tcPr/>
-                </a:tc>
-                <a:extLst>
-                  <a:ext uri="{0D108BD9-81ED-4DB2-BD59-A6C34878D82A}">
-                    <a16:rowId xmlns:a16="http://schemas.microsoft.com/office/drawing/2014/main" val="3147889545"/>
-                  </a:ext>
-                </a:extLst>
-              </a:tr>
-              <a:tr h="370840">
-                <a:tc>
-                  <a:txBody>
-                    <a:bodyPr/>
-                    <a:lstStyle/>
-                    <a:p>
-                      <a:r>
-                        <a:rPr lang="en-US" dirty="0" err="1"/>
-                        <a:t>clipIntersection</a:t>
-                      </a:r>
-                      <a:endParaRPr lang="id-ID" dirty="0"/>
-                    </a:p>
-                  </a:txBody>
-                  <a:tcPr/>
-                </a:tc>
-                <a:tc>
-                  <a:txBody>
-                    <a:bodyPr/>
-                    <a:lstStyle/>
-                    <a:p>
-                      <a:endParaRPr lang="id-ID" dirty="0"/>
-                    </a:p>
-                  </a:txBody>
-                  <a:tcPr/>
-                </a:tc>
-                <a:extLst>
-                  <a:ext uri="{0D108BD9-81ED-4DB2-BD59-A6C34878D82A}">
-                    <a16:rowId xmlns:a16="http://schemas.microsoft.com/office/drawing/2014/main" val="360838315"/>
-                  </a:ext>
-                </a:extLst>
-              </a:tr>
-            </a:tbl>
-          </a:graphicData>
-        </a:graphic>
-      </p:graphicFrame>
+        </p:nvSpPr>
+        <p:spPr/>
+        <p:txBody>
+          <a:bodyPr/>
+          <a:lstStyle/>
+          <a:p>
+            <a:r>
+              <a:rPr lang="en-US" dirty="0"/>
+              <a:t>Blending </a:t>
+            </a:r>
+            <a:r>
+              <a:rPr lang="en-US" dirty="0" err="1"/>
+              <a:t>adalah</a:t>
+            </a:r>
+            <a:r>
+              <a:rPr lang="en-US" dirty="0"/>
+              <a:t> </a:t>
+            </a:r>
+            <a:r>
+              <a:rPr lang="en-US" dirty="0" err="1"/>
+              <a:t>saat</a:t>
+            </a:r>
+            <a:r>
+              <a:rPr lang="en-US" dirty="0"/>
+              <a:t> output </a:t>
+            </a:r>
+            <a:r>
+              <a:rPr lang="en-US" dirty="0" err="1"/>
+              <a:t>dari</a:t>
+            </a:r>
+            <a:r>
+              <a:rPr lang="en-US" dirty="0"/>
+              <a:t> fragment color dan color buffer </a:t>
+            </a:r>
+            <a:r>
+              <a:rPr lang="en-US" dirty="0" err="1"/>
+              <a:t>digabung</a:t>
+            </a:r>
+            <a:r>
+              <a:rPr lang="en-US" dirty="0"/>
+              <a:t>. Teknik blending yang </a:t>
+            </a:r>
+            <a:r>
+              <a:rPr lang="en-US" dirty="0" err="1"/>
+              <a:t>disupport</a:t>
+            </a:r>
+            <a:r>
+              <a:rPr lang="en-US" dirty="0"/>
+              <a:t> oleh Three Js </a:t>
+            </a:r>
+            <a:r>
+              <a:rPr lang="en-US" dirty="0" err="1"/>
+              <a:t>ada</a:t>
+            </a:r>
+            <a:r>
+              <a:rPr lang="en-US" dirty="0"/>
+              <a:t> 6. </a:t>
+            </a:r>
+            <a:r>
+              <a:rPr lang="en-US" dirty="0" err="1"/>
+              <a:t>Yaitu</a:t>
+            </a:r>
+            <a:r>
+              <a:rPr lang="en-US" dirty="0"/>
+              <a:t> :</a:t>
+            </a:r>
+          </a:p>
+          <a:p>
+            <a:pPr>
+              <a:buFont typeface="Wingdings" panose="05000000000000000000" pitchFamily="2" charset="2"/>
+              <a:buChar char="§"/>
+            </a:pPr>
+            <a:r>
+              <a:rPr lang="en-US" dirty="0" err="1"/>
+              <a:t>NoBlending</a:t>
+            </a:r>
+            <a:endParaRPr lang="en-US" dirty="0"/>
+          </a:p>
+          <a:p>
+            <a:pPr>
+              <a:buFont typeface="Wingdings" panose="05000000000000000000" pitchFamily="2" charset="2"/>
+              <a:buChar char="§"/>
+            </a:pPr>
+            <a:r>
+              <a:rPr lang="en-US" dirty="0" err="1"/>
+              <a:t>NormalBlending</a:t>
+            </a:r>
+            <a:endParaRPr lang="en-US" dirty="0"/>
+          </a:p>
+          <a:p>
+            <a:pPr>
+              <a:buFont typeface="Wingdings" panose="05000000000000000000" pitchFamily="2" charset="2"/>
+              <a:buChar char="§"/>
+            </a:pPr>
+            <a:r>
+              <a:rPr lang="en-US" dirty="0" err="1"/>
+              <a:t>AdditiveBlending</a:t>
+            </a:r>
+            <a:endParaRPr lang="en-US" dirty="0"/>
+          </a:p>
+          <a:p>
+            <a:pPr>
+              <a:buFont typeface="Wingdings" panose="05000000000000000000" pitchFamily="2" charset="2"/>
+              <a:buChar char="§"/>
+            </a:pPr>
+            <a:r>
+              <a:rPr lang="en-US" dirty="0" err="1"/>
+              <a:t>SubtractiveBlending</a:t>
+            </a:r>
+            <a:endParaRPr lang="en-US" dirty="0"/>
+          </a:p>
+          <a:p>
+            <a:pPr>
+              <a:buFont typeface="Wingdings" panose="05000000000000000000" pitchFamily="2" charset="2"/>
+              <a:buChar char="§"/>
+            </a:pPr>
+            <a:r>
+              <a:rPr lang="en-US" dirty="0" err="1"/>
+              <a:t>MultiplyBlending</a:t>
+            </a:r>
+            <a:endParaRPr lang="en-US" dirty="0"/>
+          </a:p>
+          <a:p>
+            <a:pPr>
+              <a:buFont typeface="Wingdings" panose="05000000000000000000" pitchFamily="2" charset="2"/>
+              <a:buChar char="§"/>
+            </a:pPr>
+            <a:r>
+              <a:rPr lang="en-US" dirty="0" err="1"/>
+              <a:t>CustomBlending</a:t>
+            </a:r>
+            <a:endParaRPr lang="id-ID" dirty="0"/>
+          </a:p>
+        </p:txBody>
+      </p:sp>
     </p:spTree>
     <p:extLst>
       <p:ext uri="{BB962C8B-B14F-4D97-AF65-F5344CB8AC3E}">
-        <p14:creationId xmlns:p14="http://schemas.microsoft.com/office/powerpoint/2010/main" val="2054443548"/>
+        <p14:creationId xmlns:p14="http://schemas.microsoft.com/office/powerpoint/2010/main" val="2255089013"/>
       </p:ext>
     </p:extLst>
   </p:cSld>
@@ -4400,7 +5118,7 @@
           <p:cNvPr id="2" name="Title 1">
             <a:extLst>
               <a:ext uri="{FF2B5EF4-FFF2-40B4-BE49-F238E27FC236}">
-                <a16:creationId xmlns:a16="http://schemas.microsoft.com/office/drawing/2014/main" id="{DE19492E-DF4A-454F-B899-A876D807D50C}"/>
+                <a16:creationId xmlns:a16="http://schemas.microsoft.com/office/drawing/2014/main" id="{2B376CAB-C7AB-4398-BAAA-73775F152B37}"/>
               </a:ext>
             </a:extLst>
           </p:cNvPr>
@@ -4418,19 +5136,11 @@
           <a:p>
             <a:r>
               <a:rPr lang="en-US" dirty="0" err="1"/>
-              <a:t>Jenis</a:t>
-            </a:r>
-            <a:r>
-              <a:rPr lang="en-US" dirty="0"/>
-              <a:t> </a:t>
-            </a:r>
-            <a:r>
-              <a:rPr lang="en-US" dirty="0" err="1"/>
-              <a:t>jenis</a:t>
-            </a:r>
-            <a:r>
-              <a:rPr lang="en-US" dirty="0"/>
-              <a:t> material</a:t>
+              <a:t>Contoh</a:t>
+            </a:r>
+            <a:r>
+              <a:rPr lang="en-US" dirty="0"/>
+              <a:t> Blending</a:t>
             </a:r>
             <a:endParaRPr lang="id-ID" dirty="0"/>
           </a:p>
@@ -4441,7 +5151,7 @@
           <p:cNvPr id="3" name="Content Placeholder 2">
             <a:extLst>
               <a:ext uri="{FF2B5EF4-FFF2-40B4-BE49-F238E27FC236}">
-                <a16:creationId xmlns:a16="http://schemas.microsoft.com/office/drawing/2014/main" id="{F14EB4D7-AF39-4D02-BF97-FB815035A065}"/>
+                <a16:creationId xmlns:a16="http://schemas.microsoft.com/office/drawing/2014/main" id="{CEDCC41A-9CBB-416C-88C5-EF2AEDA6D44C}"/>
               </a:ext>
             </a:extLst>
           </p:cNvPr>
@@ -4454,130 +5164,758 @@
         </p:nvSpPr>
         <p:spPr/>
         <p:txBody>
-          <a:bodyPr numCol="2"/>
+          <a:bodyPr/>
           <a:lstStyle/>
           <a:p>
+            <a:endParaRPr lang="id-ID" dirty="0"/>
+          </a:p>
+        </p:txBody>
+      </p:sp>
+      <p:pic>
+        <p:nvPicPr>
+          <p:cNvPr id="4" name="Picture 3">
+            <a:extLst>
+              <a:ext uri="{FF2B5EF4-FFF2-40B4-BE49-F238E27FC236}">
+                <a16:creationId xmlns:a16="http://schemas.microsoft.com/office/drawing/2014/main" id="{31C79F5C-28DF-4276-A8DF-8E1983FA69EF}"/>
+              </a:ext>
+            </a:extLst>
+          </p:cNvPr>
+          <p:cNvPicPr>
+            <a:picLocks noChangeAspect="1"/>
+          </p:cNvPicPr>
+          <p:nvPr/>
+        </p:nvPicPr>
+        <p:blipFill>
+          <a:blip r:embed="rId2"/>
+          <a:stretch>
+            <a:fillRect/>
+          </a:stretch>
+        </p:blipFill>
+        <p:spPr>
+          <a:xfrm>
+            <a:off x="3496448" y="2108201"/>
+            <a:ext cx="4826610" cy="3900140"/>
+          </a:xfrm>
+          <a:prstGeom prst="rect">
+            <a:avLst/>
+          </a:prstGeom>
+        </p:spPr>
+      </p:pic>
+    </p:spTree>
+    <p:extLst>
+      <p:ext uri="{BB962C8B-B14F-4D97-AF65-F5344CB8AC3E}">
+        <p14:creationId xmlns:p14="http://schemas.microsoft.com/office/powerpoint/2010/main" val="4074933493"/>
+      </p:ext>
+    </p:extLst>
+  </p:cSld>
+  <p:clrMapOvr>
+    <a:masterClrMapping/>
+  </p:clrMapOvr>
+</p:sld>
+</file>
+
+<file path=ppt/slides/slide5.xml><?xml version="1.0" encoding="utf-8"?>
+<p:sld xmlns:a="http://schemas.openxmlformats.org/drawingml/2006/main" xmlns:r="http://schemas.openxmlformats.org/officeDocument/2006/relationships" xmlns:p="http://schemas.openxmlformats.org/presentationml/2006/main">
+  <p:cSld>
+    <p:spTree>
+      <p:nvGrpSpPr>
+        <p:cNvPr id="1" name=""/>
+        <p:cNvGrpSpPr/>
+        <p:nvPr/>
+      </p:nvGrpSpPr>
+      <p:grpSpPr>
+        <a:xfrm>
+          <a:off x="0" y="0"/>
+          <a:ext cx="0" cy="0"/>
+          <a:chOff x="0" y="0"/>
+          <a:chExt cx="0" cy="0"/>
+        </a:xfrm>
+      </p:grpSpPr>
+      <p:sp>
+        <p:nvSpPr>
+          <p:cNvPr id="2" name="Title 1">
+            <a:extLst>
+              <a:ext uri="{FF2B5EF4-FFF2-40B4-BE49-F238E27FC236}">
+                <a16:creationId xmlns:a16="http://schemas.microsoft.com/office/drawing/2014/main" id="{BEABA07B-9EF2-4F9C-8ECD-9574BD454C24}"/>
+              </a:ext>
+            </a:extLst>
+          </p:cNvPr>
+          <p:cNvSpPr>
+            <a:spLocks noGrp="1"/>
+          </p:cNvSpPr>
+          <p:nvPr>
+            <p:ph type="title"/>
+          </p:nvPr>
+        </p:nvSpPr>
+        <p:spPr/>
+        <p:txBody>
+          <a:bodyPr/>
+          <a:lstStyle/>
+          <a:p>
+            <a:r>
+              <a:rPr lang="en-US" dirty="0"/>
+              <a:t>Depth buffer</a:t>
+            </a:r>
+            <a:endParaRPr lang="id-ID" dirty="0"/>
+          </a:p>
+        </p:txBody>
+      </p:sp>
+      <p:sp>
+        <p:nvSpPr>
+          <p:cNvPr id="3" name="Content Placeholder 2">
+            <a:extLst>
+              <a:ext uri="{FF2B5EF4-FFF2-40B4-BE49-F238E27FC236}">
+                <a16:creationId xmlns:a16="http://schemas.microsoft.com/office/drawing/2014/main" id="{24CB7C0D-81DE-4970-A9B0-BB29EC92B892}"/>
+              </a:ext>
+            </a:extLst>
+          </p:cNvPr>
+          <p:cNvSpPr>
+            <a:spLocks noGrp="1"/>
+          </p:cNvSpPr>
+          <p:nvPr>
+            <p:ph idx="1"/>
+          </p:nvPr>
+        </p:nvSpPr>
+        <p:spPr>
+          <a:xfrm>
+            <a:off x="1097280" y="2108202"/>
+            <a:ext cx="10058400" cy="1450758"/>
+          </a:xfrm>
+        </p:spPr>
+        <p:txBody>
+          <a:bodyPr/>
+          <a:lstStyle/>
+          <a:p>
+            <a:r>
+              <a:rPr lang="en-US" dirty="0"/>
+              <a:t>Depth buffer </a:t>
+            </a:r>
+            <a:r>
+              <a:rPr lang="en-US" dirty="0" err="1"/>
+              <a:t>adalah</a:t>
+            </a:r>
+            <a:r>
+              <a:rPr lang="en-US" dirty="0"/>
+              <a:t> buffer yang </a:t>
+            </a:r>
+            <a:r>
+              <a:rPr lang="en-US" dirty="0" err="1"/>
+              <a:t>berfungsi</a:t>
+            </a:r>
+            <a:r>
+              <a:rPr lang="en-US" dirty="0"/>
+              <a:t> </a:t>
+            </a:r>
+            <a:r>
+              <a:rPr lang="en-US" dirty="0" err="1"/>
+              <a:t>untuk</a:t>
+            </a:r>
+            <a:r>
+              <a:rPr lang="en-US" dirty="0"/>
+              <a:t> </a:t>
+            </a:r>
+            <a:r>
+              <a:rPr lang="en-US" dirty="0" err="1"/>
+              <a:t>mengetahui</a:t>
+            </a:r>
+            <a:r>
+              <a:rPr lang="en-US" dirty="0"/>
+              <a:t> </a:t>
+            </a:r>
+            <a:r>
+              <a:rPr lang="en-US" dirty="0" err="1"/>
+              <a:t>objek</a:t>
+            </a:r>
+            <a:r>
+              <a:rPr lang="en-US" dirty="0"/>
+              <a:t> </a:t>
+            </a:r>
+            <a:r>
+              <a:rPr lang="en-US" dirty="0" err="1"/>
+              <a:t>apa</a:t>
+            </a:r>
+            <a:r>
+              <a:rPr lang="en-US" dirty="0"/>
+              <a:t> yang </a:t>
+            </a:r>
+            <a:r>
+              <a:rPr lang="en-US" dirty="0" err="1"/>
+              <a:t>dirender</a:t>
+            </a:r>
+            <a:r>
+              <a:rPr lang="en-US" dirty="0"/>
+              <a:t> </a:t>
+            </a:r>
+            <a:r>
+              <a:rPr lang="en-US" dirty="0" err="1"/>
+              <a:t>berdasarkan</a:t>
+            </a:r>
+            <a:r>
+              <a:rPr lang="en-US" dirty="0"/>
+              <a:t> </a:t>
+            </a:r>
+            <a:r>
+              <a:rPr lang="en-US" dirty="0" err="1"/>
+              <a:t>jarak</a:t>
+            </a:r>
+            <a:r>
+              <a:rPr lang="en-US" dirty="0"/>
+              <a:t> </a:t>
+            </a:r>
+            <a:r>
+              <a:rPr lang="en-US" dirty="0" err="1"/>
+              <a:t>dari</a:t>
+            </a:r>
+            <a:r>
+              <a:rPr lang="en-US" dirty="0"/>
+              <a:t> </a:t>
+            </a:r>
+            <a:r>
+              <a:rPr lang="en-US" dirty="0" err="1"/>
+              <a:t>kamera</a:t>
+            </a:r>
+            <a:r>
+              <a:rPr lang="en-US" dirty="0"/>
+              <a:t>. </a:t>
+            </a:r>
+            <a:r>
+              <a:rPr lang="en-US" dirty="0" err="1"/>
+              <a:t>Semakin</a:t>
+            </a:r>
+            <a:r>
+              <a:rPr lang="en-US" dirty="0"/>
+              <a:t> </a:t>
+            </a:r>
+            <a:r>
+              <a:rPr lang="en-US" dirty="0" err="1"/>
+              <a:t>jauh</a:t>
+            </a:r>
+            <a:r>
+              <a:rPr lang="en-US" dirty="0"/>
+              <a:t> </a:t>
+            </a:r>
+            <a:r>
+              <a:rPr lang="en-US" dirty="0" err="1"/>
+              <a:t>dari</a:t>
+            </a:r>
+            <a:r>
+              <a:rPr lang="en-US" dirty="0"/>
+              <a:t> </a:t>
+            </a:r>
+            <a:r>
+              <a:rPr lang="en-US" dirty="0" err="1"/>
+              <a:t>kamera</a:t>
+            </a:r>
+            <a:r>
+              <a:rPr lang="en-US" dirty="0"/>
+              <a:t> </a:t>
+            </a:r>
+            <a:r>
+              <a:rPr lang="en-US" dirty="0" err="1"/>
+              <a:t>semakin</a:t>
+            </a:r>
+            <a:r>
+              <a:rPr lang="en-US" dirty="0"/>
+              <a:t> </a:t>
+            </a:r>
+            <a:r>
+              <a:rPr lang="en-US" dirty="0" err="1"/>
+              <a:t>besar</a:t>
+            </a:r>
+            <a:r>
+              <a:rPr lang="en-US" dirty="0"/>
+              <a:t> </a:t>
+            </a:r>
+            <a:r>
+              <a:rPr lang="en-US" dirty="0" err="1"/>
+              <a:t>nilai</a:t>
+            </a:r>
+            <a:r>
+              <a:rPr lang="en-US" dirty="0"/>
+              <a:t> depth buffer. </a:t>
+            </a:r>
+            <a:r>
+              <a:rPr lang="en-US" dirty="0" err="1"/>
+              <a:t>Untuk</a:t>
+            </a:r>
+            <a:r>
+              <a:rPr lang="en-US" dirty="0"/>
+              <a:t> </a:t>
+            </a:r>
+            <a:r>
+              <a:rPr lang="en-US" dirty="0" err="1"/>
+              <a:t>setiap</a:t>
+            </a:r>
+            <a:r>
+              <a:rPr lang="en-US" dirty="0"/>
+              <a:t> pixel </a:t>
+            </a:r>
+            <a:r>
+              <a:rPr lang="en-US" dirty="0" err="1"/>
+              <a:t>akan</a:t>
+            </a:r>
+            <a:r>
+              <a:rPr lang="en-US" dirty="0"/>
+              <a:t> </a:t>
+            </a:r>
+            <a:r>
+              <a:rPr lang="en-US" dirty="0" err="1"/>
+              <a:t>ada</a:t>
+            </a:r>
+            <a:r>
+              <a:rPr lang="en-US" dirty="0"/>
+              <a:t> depth test, </a:t>
+            </a:r>
+            <a:r>
+              <a:rPr lang="en-US" dirty="0" err="1"/>
+              <a:t>jika</a:t>
+            </a:r>
+            <a:r>
+              <a:rPr lang="en-US" dirty="0"/>
+              <a:t> </a:t>
+            </a:r>
+            <a:r>
+              <a:rPr lang="en-US" dirty="0" err="1"/>
+              <a:t>fungsi</a:t>
+            </a:r>
+            <a:r>
+              <a:rPr lang="en-US" dirty="0"/>
+              <a:t> depth test </a:t>
+            </a:r>
+            <a:r>
+              <a:rPr lang="en-US" dirty="0" err="1"/>
+              <a:t>mengembalikan</a:t>
+            </a:r>
+            <a:r>
+              <a:rPr lang="en-US" dirty="0"/>
+              <a:t> true </a:t>
+            </a:r>
+            <a:r>
+              <a:rPr lang="en-US" dirty="0" err="1"/>
+              <a:t>maka</a:t>
+            </a:r>
+            <a:r>
+              <a:rPr lang="en-US" dirty="0"/>
+              <a:t> pixel </a:t>
+            </a:r>
+            <a:r>
+              <a:rPr lang="en-US" dirty="0" err="1"/>
+              <a:t>akan</a:t>
+            </a:r>
+            <a:r>
+              <a:rPr lang="en-US" dirty="0"/>
+              <a:t> </a:t>
+            </a:r>
+            <a:r>
+              <a:rPr lang="en-US" dirty="0" err="1"/>
+              <a:t>dirender</a:t>
+            </a:r>
+            <a:r>
+              <a:rPr lang="en-US" dirty="0"/>
+              <a:t>. Three </a:t>
+            </a:r>
+            <a:r>
+              <a:rPr lang="en-US" dirty="0" err="1"/>
+              <a:t>js</a:t>
+            </a:r>
+            <a:r>
+              <a:rPr lang="en-US" dirty="0"/>
+              <a:t> </a:t>
+            </a:r>
+            <a:r>
+              <a:rPr lang="en-US" dirty="0" err="1"/>
+              <a:t>mendukung</a:t>
+            </a:r>
+            <a:r>
+              <a:rPr lang="en-US" dirty="0"/>
+              <a:t> 7 </a:t>
+            </a:r>
+            <a:r>
+              <a:rPr lang="en-US" dirty="0" err="1"/>
+              <a:t>fungsi</a:t>
+            </a:r>
+            <a:r>
+              <a:rPr lang="en-US" dirty="0"/>
+              <a:t> depth, </a:t>
+            </a:r>
+            <a:r>
+              <a:rPr lang="en-US" dirty="0" err="1"/>
+              <a:t>yaitu</a:t>
+            </a:r>
+            <a:r>
+              <a:rPr lang="en-US" dirty="0"/>
+              <a:t> :</a:t>
+            </a:r>
+          </a:p>
+          <a:p>
+            <a:endParaRPr lang="id-ID" dirty="0"/>
+          </a:p>
+        </p:txBody>
+      </p:sp>
+      <p:sp>
+        <p:nvSpPr>
+          <p:cNvPr id="8" name="Content Placeholder 2">
+            <a:extLst>
+              <a:ext uri="{FF2B5EF4-FFF2-40B4-BE49-F238E27FC236}">
+                <a16:creationId xmlns:a16="http://schemas.microsoft.com/office/drawing/2014/main" id="{7E4635E4-7E6A-42B5-B68F-464BDEB4DB8C}"/>
+              </a:ext>
+            </a:extLst>
+          </p:cNvPr>
+          <p:cNvSpPr txBox="1">
+            <a:spLocks/>
+          </p:cNvSpPr>
+          <p:nvPr/>
+        </p:nvSpPr>
+        <p:spPr>
+          <a:xfrm>
+            <a:off x="1097280" y="3558961"/>
+            <a:ext cx="10058400" cy="2347318"/>
+          </a:xfrm>
+          <a:prstGeom prst="rect">
+            <a:avLst/>
+          </a:prstGeom>
+        </p:spPr>
+        <p:txBody>
+          <a:bodyPr vert="horz" lIns="0" tIns="45720" rIns="0" bIns="45720" numCol="2" rtlCol="0">
+            <a:normAutofit lnSpcReduction="10000"/>
+          </a:bodyPr>
+          <a:lstStyle>
+            <a:lvl1pPr marL="91440" indent="-91440" algn="l" defTabSz="914400" rtl="0" eaLnBrk="1" latinLnBrk="0" hangingPunct="1">
+              <a:lnSpc>
+                <a:spcPct val="110000"/>
+              </a:lnSpc>
+              <a:spcBef>
+                <a:spcPts val="1200"/>
+              </a:spcBef>
+              <a:spcAft>
+                <a:spcPts val="200"/>
+              </a:spcAft>
+              <a:buClr>
+                <a:schemeClr val="accent1"/>
+              </a:buClr>
+              <a:buSzPct val="100000"/>
+              <a:buFont typeface="Calibri" panose="020F0502020204030204" pitchFamily="34" charset="0"/>
+              <a:buChar char=" "/>
+              <a:defRPr sz="1900" kern="1200">
+                <a:solidFill>
+                  <a:schemeClr val="tx1">
+                    <a:lumMod val="75000"/>
+                    <a:lumOff val="25000"/>
+                  </a:schemeClr>
+                </a:solidFill>
+                <a:latin typeface="+mn-lt"/>
+                <a:ea typeface="+mn-ea"/>
+                <a:cs typeface="+mn-cs"/>
+              </a:defRPr>
+            </a:lvl1pPr>
+            <a:lvl2pPr marL="384048" indent="-182880" algn="l" defTabSz="914400" rtl="0" eaLnBrk="1" latinLnBrk="0" hangingPunct="1">
+              <a:lnSpc>
+                <a:spcPct val="100000"/>
+              </a:lnSpc>
+              <a:spcBef>
+                <a:spcPts val="200"/>
+              </a:spcBef>
+              <a:spcAft>
+                <a:spcPts val="400"/>
+              </a:spcAft>
+              <a:buClrTx/>
+              <a:buFont typeface="Calibri" pitchFamily="34" charset="0"/>
+              <a:buChar char="◦"/>
+              <a:defRPr sz="1700" kern="1200">
+                <a:solidFill>
+                  <a:schemeClr val="tx1">
+                    <a:lumMod val="75000"/>
+                    <a:lumOff val="25000"/>
+                  </a:schemeClr>
+                </a:solidFill>
+                <a:latin typeface="+mn-lt"/>
+                <a:ea typeface="+mn-ea"/>
+                <a:cs typeface="+mn-cs"/>
+              </a:defRPr>
+            </a:lvl2pPr>
+            <a:lvl3pPr marL="566928" indent="-182880" algn="l" defTabSz="914400" rtl="0" eaLnBrk="1" latinLnBrk="0" hangingPunct="1">
+              <a:lnSpc>
+                <a:spcPct val="100000"/>
+              </a:lnSpc>
+              <a:spcBef>
+                <a:spcPts val="200"/>
+              </a:spcBef>
+              <a:spcAft>
+                <a:spcPts val="400"/>
+              </a:spcAft>
+              <a:buClrTx/>
+              <a:buFont typeface="Calibri" pitchFamily="34" charset="0"/>
+              <a:buChar char="◦"/>
+              <a:defRPr sz="1300" kern="1200">
+                <a:solidFill>
+                  <a:schemeClr val="tx1">
+                    <a:lumMod val="75000"/>
+                    <a:lumOff val="25000"/>
+                  </a:schemeClr>
+                </a:solidFill>
+                <a:latin typeface="+mn-lt"/>
+                <a:ea typeface="+mn-ea"/>
+                <a:cs typeface="+mn-cs"/>
+              </a:defRPr>
+            </a:lvl3pPr>
+            <a:lvl4pPr marL="749808" indent="-182880" algn="l" defTabSz="914400" rtl="0" eaLnBrk="1" latinLnBrk="0" hangingPunct="1">
+              <a:lnSpc>
+                <a:spcPct val="100000"/>
+              </a:lnSpc>
+              <a:spcBef>
+                <a:spcPts val="200"/>
+              </a:spcBef>
+              <a:spcAft>
+                <a:spcPts val="400"/>
+              </a:spcAft>
+              <a:buClrTx/>
+              <a:buFont typeface="Calibri" pitchFamily="34" charset="0"/>
+              <a:buChar char="◦"/>
+              <a:defRPr sz="1300" kern="1200">
+                <a:solidFill>
+                  <a:schemeClr val="tx1">
+                    <a:lumMod val="75000"/>
+                    <a:lumOff val="25000"/>
+                  </a:schemeClr>
+                </a:solidFill>
+                <a:latin typeface="+mn-lt"/>
+                <a:ea typeface="+mn-ea"/>
+                <a:cs typeface="+mn-cs"/>
+              </a:defRPr>
+            </a:lvl4pPr>
+            <a:lvl5pPr marL="932688" indent="-182880" algn="l" defTabSz="914400" rtl="0" eaLnBrk="1" latinLnBrk="0" hangingPunct="1">
+              <a:lnSpc>
+                <a:spcPct val="100000"/>
+              </a:lnSpc>
+              <a:spcBef>
+                <a:spcPts val="200"/>
+              </a:spcBef>
+              <a:spcAft>
+                <a:spcPts val="400"/>
+              </a:spcAft>
+              <a:buClrTx/>
+              <a:buFont typeface="Calibri" pitchFamily="34" charset="0"/>
+              <a:buChar char="◦"/>
+              <a:defRPr sz="1300" kern="1200">
+                <a:solidFill>
+                  <a:schemeClr val="tx1">
+                    <a:lumMod val="75000"/>
+                    <a:lumOff val="25000"/>
+                  </a:schemeClr>
+                </a:solidFill>
+                <a:latin typeface="+mn-lt"/>
+                <a:ea typeface="+mn-ea"/>
+                <a:cs typeface="+mn-cs"/>
+              </a:defRPr>
+            </a:lvl5pPr>
+            <a:lvl6pPr marL="1100000" indent="-228600" algn="l" defTabSz="914400" rtl="0" eaLnBrk="1" latinLnBrk="0" hangingPunct="1">
+              <a:lnSpc>
+                <a:spcPct val="90000"/>
+              </a:lnSpc>
+              <a:spcBef>
+                <a:spcPts val="200"/>
+              </a:spcBef>
+              <a:spcAft>
+                <a:spcPts val="400"/>
+              </a:spcAft>
+              <a:buClr>
+                <a:schemeClr val="accent1"/>
+              </a:buClr>
+              <a:buFont typeface="Calibri" pitchFamily="34" charset="0"/>
+              <a:buChar char="◦"/>
+              <a:defRPr sz="1400" kern="1200">
+                <a:solidFill>
+                  <a:schemeClr val="tx1">
+                    <a:lumMod val="75000"/>
+                    <a:lumOff val="25000"/>
+                  </a:schemeClr>
+                </a:solidFill>
+                <a:latin typeface="+mn-lt"/>
+                <a:ea typeface="+mn-ea"/>
+                <a:cs typeface="+mn-cs"/>
+              </a:defRPr>
+            </a:lvl6pPr>
+            <a:lvl7pPr marL="1300000" indent="-228600" algn="l" defTabSz="914400" rtl="0" eaLnBrk="1" latinLnBrk="0" hangingPunct="1">
+              <a:lnSpc>
+                <a:spcPct val="90000"/>
+              </a:lnSpc>
+              <a:spcBef>
+                <a:spcPts val="200"/>
+              </a:spcBef>
+              <a:spcAft>
+                <a:spcPts val="400"/>
+              </a:spcAft>
+              <a:buClr>
+                <a:schemeClr val="accent1"/>
+              </a:buClr>
+              <a:buFont typeface="Calibri" pitchFamily="34" charset="0"/>
+              <a:buChar char="◦"/>
+              <a:defRPr sz="1400" kern="1200">
+                <a:solidFill>
+                  <a:schemeClr val="tx1">
+                    <a:lumMod val="75000"/>
+                    <a:lumOff val="25000"/>
+                  </a:schemeClr>
+                </a:solidFill>
+                <a:latin typeface="+mn-lt"/>
+                <a:ea typeface="+mn-ea"/>
+                <a:cs typeface="+mn-cs"/>
+              </a:defRPr>
+            </a:lvl7pPr>
+            <a:lvl8pPr marL="1500000" indent="-228600" algn="l" defTabSz="914400" rtl="0" eaLnBrk="1" latinLnBrk="0" hangingPunct="1">
+              <a:lnSpc>
+                <a:spcPct val="90000"/>
+              </a:lnSpc>
+              <a:spcBef>
+                <a:spcPts val="200"/>
+              </a:spcBef>
+              <a:spcAft>
+                <a:spcPts val="400"/>
+              </a:spcAft>
+              <a:buClr>
+                <a:schemeClr val="accent1"/>
+              </a:buClr>
+              <a:buFont typeface="Calibri" pitchFamily="34" charset="0"/>
+              <a:buChar char="◦"/>
+              <a:defRPr sz="1400" kern="1200">
+                <a:solidFill>
+                  <a:schemeClr val="tx1">
+                    <a:lumMod val="75000"/>
+                    <a:lumOff val="25000"/>
+                  </a:schemeClr>
+                </a:solidFill>
+                <a:latin typeface="+mn-lt"/>
+                <a:ea typeface="+mn-ea"/>
+                <a:cs typeface="+mn-cs"/>
+              </a:defRPr>
+            </a:lvl8pPr>
+            <a:lvl9pPr marL="1700000" indent="-228600" algn="l" defTabSz="914400" rtl="0" eaLnBrk="1" latinLnBrk="0" hangingPunct="1">
+              <a:lnSpc>
+                <a:spcPct val="90000"/>
+              </a:lnSpc>
+              <a:spcBef>
+                <a:spcPts val="200"/>
+              </a:spcBef>
+              <a:spcAft>
+                <a:spcPts val="400"/>
+              </a:spcAft>
+              <a:buClr>
+                <a:schemeClr val="accent1"/>
+              </a:buClr>
+              <a:buFont typeface="Calibri" pitchFamily="34" charset="0"/>
+              <a:buChar char="◦"/>
+              <a:defRPr sz="1400" kern="1200">
+                <a:solidFill>
+                  <a:schemeClr val="tx1">
+                    <a:lumMod val="75000"/>
+                    <a:lumOff val="25000"/>
+                  </a:schemeClr>
+                </a:solidFill>
+                <a:latin typeface="+mn-lt"/>
+                <a:ea typeface="+mn-ea"/>
+                <a:cs typeface="+mn-cs"/>
+              </a:defRPr>
+            </a:lvl9pPr>
+          </a:lstStyle>
+          <a:p>
             <a:pPr>
-              <a:buFont typeface="Arial" panose="020B0604020202020204" pitchFamily="34" charset="0"/>
-              <a:buChar char="•"/>
+              <a:buFont typeface="Wingdings" panose="05000000000000000000" pitchFamily="2" charset="2"/>
+              <a:buChar char="§"/>
             </a:pPr>
             <a:r>
               <a:rPr lang="en-US" dirty="0" err="1"/>
-              <a:t>MeshBasicMaterial</a:t>
+              <a:t>NeverDepth</a:t>
             </a:r>
             <a:endParaRPr lang="en-US" dirty="0"/>
           </a:p>
           <a:p>
             <a:pPr>
-              <a:buFont typeface="Arial" panose="020B0604020202020204" pitchFamily="34" charset="0"/>
-              <a:buChar char="•"/>
+              <a:buFont typeface="Wingdings" panose="05000000000000000000" pitchFamily="2" charset="2"/>
+              <a:buChar char="§"/>
             </a:pPr>
             <a:r>
               <a:rPr lang="en-US" dirty="0" err="1"/>
-              <a:t>MeshNormalMaterial</a:t>
+              <a:t>AlwaysDepth</a:t>
             </a:r>
             <a:endParaRPr lang="en-US" dirty="0"/>
           </a:p>
           <a:p>
             <a:pPr>
-              <a:buFont typeface="Arial" panose="020B0604020202020204" pitchFamily="34" charset="0"/>
-              <a:buChar char="•"/>
+              <a:buFont typeface="Wingdings" panose="05000000000000000000" pitchFamily="2" charset="2"/>
+              <a:buChar char="§"/>
             </a:pPr>
             <a:r>
               <a:rPr lang="en-US" dirty="0" err="1"/>
-              <a:t>MeshLambertMaterial</a:t>
+              <a:t>LessDepth</a:t>
             </a:r>
             <a:endParaRPr lang="en-US" dirty="0"/>
           </a:p>
           <a:p>
             <a:pPr>
-              <a:buFont typeface="Arial" panose="020B0604020202020204" pitchFamily="34" charset="0"/>
-              <a:buChar char="•"/>
+              <a:buFont typeface="Wingdings" panose="05000000000000000000" pitchFamily="2" charset="2"/>
+              <a:buChar char="§"/>
             </a:pPr>
             <a:r>
               <a:rPr lang="en-US" dirty="0" err="1"/>
-              <a:t>MeshPhongMaterial</a:t>
+              <a:t>LessEqualDepth</a:t>
             </a:r>
             <a:endParaRPr lang="en-US" dirty="0"/>
           </a:p>
           <a:p>
             <a:pPr>
-              <a:buFont typeface="Arial" panose="020B0604020202020204" pitchFamily="34" charset="0"/>
-              <a:buChar char="•"/>
-            </a:pPr>
-            <a:r>
-              <a:rPr lang="en-US" dirty="0" err="1"/>
-              <a:t>MeshStandardMaterial</a:t>
-            </a:r>
-            <a:endParaRPr lang="en-US" dirty="0"/>
-          </a:p>
-          <a:p>
-            <a:pPr>
-              <a:buFont typeface="Arial" panose="020B0604020202020204" pitchFamily="34" charset="0"/>
-              <a:buChar char="•"/>
+              <a:buFont typeface="Wingdings" panose="05000000000000000000" pitchFamily="2" charset="2"/>
+              <a:buChar char="§"/>
             </a:pPr>
             <a:endParaRPr lang="en-US" dirty="0"/>
           </a:p>
           <a:p>
             <a:pPr>
-              <a:buFont typeface="Arial" panose="020B0604020202020204" pitchFamily="34" charset="0"/>
-              <a:buChar char="•"/>
+              <a:buFont typeface="Wingdings" panose="05000000000000000000" pitchFamily="2" charset="2"/>
+              <a:buChar char="§"/>
+            </a:pPr>
+            <a:r>
+              <a:rPr lang="en-US" dirty="0" err="1"/>
+              <a:t>GreaterEqualDepth</a:t>
+            </a:r>
+            <a:endParaRPr lang="en-US" dirty="0"/>
+          </a:p>
+          <a:p>
+            <a:pPr>
+              <a:buFont typeface="Wingdings" panose="05000000000000000000" pitchFamily="2" charset="2"/>
+              <a:buChar char="§"/>
+            </a:pPr>
+            <a:r>
+              <a:rPr lang="en-US" dirty="0"/>
+              <a:t> </a:t>
+            </a:r>
+            <a:r>
+              <a:rPr lang="en-US" dirty="0" err="1"/>
+              <a:t>GreaterDepth</a:t>
+            </a:r>
+            <a:endParaRPr lang="en-US" dirty="0"/>
+          </a:p>
+          <a:p>
+            <a:pPr>
+              <a:buFont typeface="Wingdings" panose="05000000000000000000" pitchFamily="2" charset="2"/>
+              <a:buChar char="§"/>
+            </a:pPr>
+            <a:r>
+              <a:rPr lang="en-US" dirty="0" err="1"/>
+              <a:t>NotEqualDepth</a:t>
+            </a:r>
+            <a:r>
+              <a:rPr lang="en-US" dirty="0"/>
+              <a:t> </a:t>
+            </a:r>
+          </a:p>
+          <a:p>
+            <a:pPr>
+              <a:buFont typeface="Wingdings" panose="05000000000000000000" pitchFamily="2" charset="2"/>
+              <a:buChar char="§"/>
             </a:pPr>
             <a:endParaRPr lang="en-US" dirty="0"/>
           </a:p>
           <a:p>
-            <a:pPr>
-              <a:buFont typeface="Arial" panose="020B0604020202020204" pitchFamily="34" charset="0"/>
-              <a:buChar char="•"/>
-            </a:pPr>
-            <a:r>
-              <a:rPr lang="en-US" dirty="0" err="1"/>
-              <a:t>LineBasicMaterial</a:t>
-            </a:r>
-            <a:endParaRPr lang="en-US" dirty="0"/>
-          </a:p>
-          <a:p>
-            <a:pPr>
-              <a:buFont typeface="Arial" panose="020B0604020202020204" pitchFamily="34" charset="0"/>
-              <a:buChar char="•"/>
-            </a:pPr>
-            <a:r>
-              <a:rPr lang="en-US" dirty="0" err="1"/>
-              <a:t>MeshDepthMaterial</a:t>
-            </a:r>
-            <a:endParaRPr lang="en-US" dirty="0"/>
-          </a:p>
-          <a:p>
-            <a:pPr>
-              <a:buFont typeface="Arial" panose="020B0604020202020204" pitchFamily="34" charset="0"/>
-              <a:buChar char="•"/>
-            </a:pPr>
-            <a:r>
-              <a:rPr lang="en-US" dirty="0" err="1"/>
-              <a:t>LineDashedMaterial</a:t>
-            </a:r>
-            <a:endParaRPr lang="en-US" dirty="0"/>
-          </a:p>
-          <a:p>
-            <a:pPr>
-              <a:buFont typeface="Arial" panose="020B0604020202020204" pitchFamily="34" charset="0"/>
-              <a:buChar char="•"/>
-            </a:pPr>
-            <a:r>
-              <a:rPr lang="en-US" dirty="0" err="1"/>
-              <a:t>PointsMaterial</a:t>
-            </a:r>
-            <a:endParaRPr lang="en-US" dirty="0"/>
-          </a:p>
-          <a:p>
-            <a:pPr>
-              <a:buFont typeface="Arial" panose="020B0604020202020204" pitchFamily="34" charset="0"/>
-              <a:buChar char="•"/>
-            </a:pPr>
-            <a:r>
-              <a:rPr lang="en-US" dirty="0" err="1"/>
-              <a:t>SpriteMaterial</a:t>
-            </a:r>
             <a:endParaRPr lang="id-ID" dirty="0"/>
           </a:p>
         </p:txBody>
@@ -4585,7 +5923,1610 @@
     </p:spTree>
     <p:extLst>
       <p:ext uri="{BB962C8B-B14F-4D97-AF65-F5344CB8AC3E}">
-        <p14:creationId xmlns:p14="http://schemas.microsoft.com/office/powerpoint/2010/main" val="583858924"/>
+        <p14:creationId xmlns:p14="http://schemas.microsoft.com/office/powerpoint/2010/main" val="1754216513"/>
+      </p:ext>
+    </p:extLst>
+  </p:cSld>
+  <p:clrMapOvr>
+    <a:masterClrMapping/>
+  </p:clrMapOvr>
+</p:sld>
+</file>
+
+<file path=ppt/slides/slide6.xml><?xml version="1.0" encoding="utf-8"?>
+<p:sld xmlns:a="http://schemas.openxmlformats.org/drawingml/2006/main" xmlns:r="http://schemas.openxmlformats.org/officeDocument/2006/relationships" xmlns:p="http://schemas.openxmlformats.org/presentationml/2006/main">
+  <p:cSld>
+    <p:spTree>
+      <p:nvGrpSpPr>
+        <p:cNvPr id="1" name=""/>
+        <p:cNvGrpSpPr/>
+        <p:nvPr/>
+      </p:nvGrpSpPr>
+      <p:grpSpPr>
+        <a:xfrm>
+          <a:off x="0" y="0"/>
+          <a:ext cx="0" cy="0"/>
+          <a:chOff x="0" y="0"/>
+          <a:chExt cx="0" cy="0"/>
+        </a:xfrm>
+      </p:grpSpPr>
+      <p:sp>
+        <p:nvSpPr>
+          <p:cNvPr id="2" name="Title 1">
+            <a:extLst>
+              <a:ext uri="{FF2B5EF4-FFF2-40B4-BE49-F238E27FC236}">
+                <a16:creationId xmlns:a16="http://schemas.microsoft.com/office/drawing/2014/main" id="{F390FA13-80C1-44BE-BDFC-94BC0A5DC1F4}"/>
+              </a:ext>
+            </a:extLst>
+          </p:cNvPr>
+          <p:cNvSpPr>
+            <a:spLocks noGrp="1"/>
+          </p:cNvSpPr>
+          <p:nvPr>
+            <p:ph type="title"/>
+          </p:nvPr>
+        </p:nvSpPr>
+        <p:spPr/>
+        <p:txBody>
+          <a:bodyPr/>
+          <a:lstStyle/>
+          <a:p>
+            <a:r>
+              <a:rPr lang="en-US" dirty="0"/>
+              <a:t>Stencil buffer</a:t>
+            </a:r>
+            <a:endParaRPr lang="id-ID" dirty="0"/>
+          </a:p>
+        </p:txBody>
+      </p:sp>
+      <p:sp>
+        <p:nvSpPr>
+          <p:cNvPr id="3" name="Content Placeholder 2">
+            <a:extLst>
+              <a:ext uri="{FF2B5EF4-FFF2-40B4-BE49-F238E27FC236}">
+                <a16:creationId xmlns:a16="http://schemas.microsoft.com/office/drawing/2014/main" id="{3F0C45EB-861A-4E2F-B9FC-F43C678E6C4D}"/>
+              </a:ext>
+            </a:extLst>
+          </p:cNvPr>
+          <p:cNvSpPr>
+            <a:spLocks noGrp="1"/>
+          </p:cNvSpPr>
+          <p:nvPr>
+            <p:ph idx="1"/>
+          </p:nvPr>
+        </p:nvSpPr>
+        <p:spPr/>
+        <p:txBody>
+          <a:bodyPr/>
+          <a:lstStyle/>
+          <a:p>
+            <a:pPr marL="0" indent="0">
+              <a:buNone/>
+            </a:pPr>
+            <a:r>
+              <a:rPr lang="en-US" dirty="0"/>
+              <a:t>Stencil buffer </a:t>
+            </a:r>
+            <a:r>
+              <a:rPr lang="en-US" dirty="0" err="1"/>
+              <a:t>adalah</a:t>
+            </a:r>
+            <a:r>
+              <a:rPr lang="en-US" dirty="0"/>
+              <a:t> buffer utility yang </a:t>
+            </a:r>
+            <a:r>
+              <a:rPr lang="en-US" dirty="0" err="1"/>
+              <a:t>bisa</a:t>
+            </a:r>
+            <a:r>
+              <a:rPr lang="en-US" dirty="0"/>
+              <a:t> </a:t>
+            </a:r>
+            <a:r>
+              <a:rPr lang="en-US" dirty="0" err="1"/>
+              <a:t>dikostumisasi</a:t>
+            </a:r>
+            <a:r>
+              <a:rPr lang="en-US" dirty="0"/>
+              <a:t> </a:t>
+            </a:r>
+            <a:r>
+              <a:rPr lang="en-US" dirty="0" err="1"/>
+              <a:t>semau</a:t>
+            </a:r>
+            <a:r>
+              <a:rPr lang="en-US" dirty="0"/>
+              <a:t> </a:t>
+            </a:r>
+            <a:r>
+              <a:rPr lang="en-US" dirty="0" err="1"/>
+              <a:t>kita</a:t>
+            </a:r>
+            <a:r>
+              <a:rPr lang="en-US" dirty="0"/>
+              <a:t>. </a:t>
+            </a:r>
+            <a:r>
+              <a:rPr lang="en-US" dirty="0" err="1"/>
+              <a:t>Tidak</a:t>
+            </a:r>
+            <a:r>
+              <a:rPr lang="en-US" dirty="0"/>
+              <a:t> </a:t>
+            </a:r>
+            <a:r>
+              <a:rPr lang="en-US" dirty="0" err="1"/>
+              <a:t>seperti</a:t>
+            </a:r>
+            <a:r>
+              <a:rPr lang="en-US" dirty="0"/>
+              <a:t> color buffer </a:t>
+            </a:r>
+            <a:r>
+              <a:rPr lang="en-US" dirty="0" err="1"/>
+              <a:t>atau</a:t>
+            </a:r>
+            <a:r>
+              <a:rPr lang="en-US" dirty="0"/>
+              <a:t> depth buffer, stencil buffer </a:t>
+            </a:r>
+            <a:r>
+              <a:rPr lang="en-US" dirty="0" err="1"/>
+              <a:t>tidak</a:t>
+            </a:r>
+            <a:r>
+              <a:rPr lang="en-US" dirty="0"/>
+              <a:t> </a:t>
+            </a:r>
+            <a:r>
+              <a:rPr lang="en-US" dirty="0" err="1"/>
+              <a:t>akan</a:t>
+            </a:r>
+            <a:r>
+              <a:rPr lang="en-US" dirty="0"/>
+              <a:t> </a:t>
+            </a:r>
+            <a:r>
+              <a:rPr lang="en-US" dirty="0" err="1"/>
+              <a:t>terlihat</a:t>
+            </a:r>
+            <a:r>
+              <a:rPr lang="en-US" dirty="0"/>
+              <a:t> </a:t>
+            </a:r>
+            <a:r>
+              <a:rPr lang="en-US" dirty="0" err="1"/>
+              <a:t>langsung</a:t>
+            </a:r>
+            <a:r>
+              <a:rPr lang="en-US" dirty="0"/>
+              <a:t> </a:t>
+            </a:r>
+            <a:r>
+              <a:rPr lang="en-US" dirty="0" err="1"/>
+              <a:t>effectnya</a:t>
+            </a:r>
+            <a:r>
+              <a:rPr lang="en-US" dirty="0"/>
+              <a:t>. </a:t>
+            </a:r>
+            <a:r>
+              <a:rPr lang="en-US" dirty="0" err="1"/>
+              <a:t>Untuk</a:t>
+            </a:r>
+            <a:r>
+              <a:rPr lang="en-US" dirty="0"/>
+              <a:t> </a:t>
+            </a:r>
+            <a:r>
+              <a:rPr lang="en-US" dirty="0" err="1"/>
+              <a:t>setiap</a:t>
+            </a:r>
+            <a:r>
+              <a:rPr lang="en-US" dirty="0"/>
+              <a:t> pixel </a:t>
+            </a:r>
+            <a:r>
+              <a:rPr lang="en-US" dirty="0" err="1"/>
+              <a:t>akan</a:t>
+            </a:r>
+            <a:r>
+              <a:rPr lang="en-US" dirty="0"/>
+              <a:t> </a:t>
+            </a:r>
+            <a:r>
+              <a:rPr lang="en-US" dirty="0" err="1"/>
+              <a:t>menyimpan</a:t>
+            </a:r>
+            <a:r>
+              <a:rPr lang="en-US" dirty="0"/>
+              <a:t> 1 byte </a:t>
+            </a:r>
+            <a:r>
+              <a:rPr lang="en-US" dirty="0" err="1"/>
+              <a:t>jadi</a:t>
+            </a:r>
+            <a:r>
+              <a:rPr lang="en-US" dirty="0"/>
+              <a:t> </a:t>
+            </a:r>
+            <a:r>
+              <a:rPr lang="en-US" dirty="0" err="1"/>
+              <a:t>dapat</a:t>
+            </a:r>
+            <a:r>
+              <a:rPr lang="en-US" dirty="0"/>
+              <a:t> </a:t>
+            </a:r>
+            <a:r>
+              <a:rPr lang="en-US" dirty="0" err="1"/>
+              <a:t>menyimpan</a:t>
+            </a:r>
+            <a:r>
+              <a:rPr lang="en-US" dirty="0"/>
+              <a:t> </a:t>
+            </a:r>
+            <a:r>
+              <a:rPr lang="en-US" dirty="0" err="1"/>
+              <a:t>angka</a:t>
+            </a:r>
+            <a:r>
+              <a:rPr lang="en-US" dirty="0"/>
+              <a:t> </a:t>
+            </a:r>
+            <a:r>
+              <a:rPr lang="en-US" dirty="0" err="1"/>
+              <a:t>dari</a:t>
+            </a:r>
+            <a:r>
+              <a:rPr lang="en-US" dirty="0"/>
+              <a:t> 0 </a:t>
+            </a:r>
+            <a:r>
+              <a:rPr lang="en-US" dirty="0" err="1"/>
+              <a:t>sampai</a:t>
+            </a:r>
+            <a:r>
+              <a:rPr lang="en-US" dirty="0"/>
+              <a:t> 255. </a:t>
+            </a:r>
+            <a:r>
+              <a:rPr lang="en-US" dirty="0" err="1"/>
+              <a:t>Setiap</a:t>
+            </a:r>
+            <a:r>
+              <a:rPr lang="en-US" dirty="0"/>
+              <a:t> material </a:t>
+            </a:r>
+            <a:r>
+              <a:rPr lang="en-US" dirty="0" err="1"/>
+              <a:t>akan</a:t>
+            </a:r>
+            <a:r>
+              <a:rPr lang="en-US" dirty="0"/>
+              <a:t> </a:t>
+            </a:r>
+            <a:r>
+              <a:rPr lang="en-US" dirty="0" err="1"/>
+              <a:t>mempunyai</a:t>
+            </a:r>
+            <a:r>
+              <a:rPr lang="en-US" dirty="0"/>
+              <a:t> </a:t>
+            </a:r>
+            <a:r>
+              <a:rPr lang="en-US" dirty="0" err="1"/>
+              <a:t>properti</a:t>
+            </a:r>
+            <a:r>
+              <a:rPr lang="en-US" dirty="0"/>
+              <a:t> stencil </a:t>
+            </a:r>
+            <a:r>
+              <a:rPr lang="en-US" dirty="0" err="1"/>
+              <a:t>berikut</a:t>
+            </a:r>
+            <a:endParaRPr lang="en-US" dirty="0"/>
+          </a:p>
+          <a:p>
+            <a:pPr marL="0" indent="0">
+              <a:buNone/>
+            </a:pPr>
+            <a:endParaRPr lang="en-US" dirty="0"/>
+          </a:p>
+          <a:p>
+            <a:pPr marL="0" indent="0">
+              <a:buNone/>
+            </a:pPr>
+            <a:endParaRPr lang="id-ID" dirty="0"/>
+          </a:p>
+        </p:txBody>
+      </p:sp>
+      <p:graphicFrame>
+        <p:nvGraphicFramePr>
+          <p:cNvPr id="4" name="Table 4">
+            <a:extLst>
+              <a:ext uri="{FF2B5EF4-FFF2-40B4-BE49-F238E27FC236}">
+                <a16:creationId xmlns:a16="http://schemas.microsoft.com/office/drawing/2014/main" id="{F1D4FA88-3DCB-4F63-8A33-131C0947E9DE}"/>
+              </a:ext>
+            </a:extLst>
+          </p:cNvPr>
+          <p:cNvGraphicFramePr>
+            <a:graphicFrameLocks noGrp="1"/>
+          </p:cNvGraphicFramePr>
+          <p:nvPr>
+            <p:extLst>
+              <p:ext uri="{D42A27DB-BD31-4B8C-83A1-F6EECF244321}">
+                <p14:modId xmlns:p14="http://schemas.microsoft.com/office/powerpoint/2010/main" val="908577220"/>
+              </p:ext>
+            </p:extLst>
+          </p:nvPr>
+        </p:nvGraphicFramePr>
+        <p:xfrm>
+          <a:off x="1036320" y="3562454"/>
+          <a:ext cx="10119360" cy="2494280"/>
+        </p:xfrm>
+        <a:graphic>
+          <a:graphicData uri="http://schemas.openxmlformats.org/drawingml/2006/table">
+            <a:tbl>
+              <a:tblPr firstRow="1" bandRow="1">
+                <a:tableStyleId>{0E3FDE45-AF77-4B5C-9715-49D594BDF05E}</a:tableStyleId>
+              </a:tblPr>
+              <a:tblGrid>
+                <a:gridCol w="3373120">
+                  <a:extLst>
+                    <a:ext uri="{9D8B030D-6E8A-4147-A177-3AD203B41FA5}">
+                      <a16:colId xmlns:a16="http://schemas.microsoft.com/office/drawing/2014/main" val="1707341823"/>
+                    </a:ext>
+                  </a:extLst>
+                </a:gridCol>
+                <a:gridCol w="3373120">
+                  <a:extLst>
+                    <a:ext uri="{9D8B030D-6E8A-4147-A177-3AD203B41FA5}">
+                      <a16:colId xmlns:a16="http://schemas.microsoft.com/office/drawing/2014/main" val="2852480182"/>
+                    </a:ext>
+                  </a:extLst>
+                </a:gridCol>
+                <a:gridCol w="3373120">
+                  <a:extLst>
+                    <a:ext uri="{9D8B030D-6E8A-4147-A177-3AD203B41FA5}">
+                      <a16:colId xmlns:a16="http://schemas.microsoft.com/office/drawing/2014/main" val="523332350"/>
+                    </a:ext>
+                  </a:extLst>
+                </a:gridCol>
+              </a:tblGrid>
+              <a:tr h="370840">
+                <a:tc>
+                  <a:txBody>
+                    <a:bodyPr/>
+                    <a:lstStyle/>
+                    <a:p>
+                      <a:pPr algn="ctr"/>
+                      <a:r>
+                        <a:rPr lang="en-US" dirty="0" err="1"/>
+                        <a:t>Properti</a:t>
+                      </a:r>
+                      <a:endParaRPr lang="id-ID" dirty="0"/>
+                    </a:p>
+                  </a:txBody>
+                  <a:tcPr/>
+                </a:tc>
+                <a:tc>
+                  <a:txBody>
+                    <a:bodyPr/>
+                    <a:lstStyle/>
+                    <a:p>
+                      <a:pPr algn="ctr"/>
+                      <a:r>
+                        <a:rPr lang="en-US" dirty="0" err="1"/>
+                        <a:t>Tipe</a:t>
+                      </a:r>
+                      <a:endParaRPr lang="id-ID" dirty="0"/>
+                    </a:p>
+                  </a:txBody>
+                  <a:tcPr/>
+                </a:tc>
+                <a:tc>
+                  <a:txBody>
+                    <a:bodyPr/>
+                    <a:lstStyle/>
+                    <a:p>
+                      <a:pPr algn="ctr"/>
+                      <a:r>
+                        <a:rPr lang="en-US" dirty="0" err="1"/>
+                        <a:t>Fungsi</a:t>
+                      </a:r>
+                      <a:endParaRPr lang="id-ID" dirty="0"/>
+                    </a:p>
+                  </a:txBody>
+                  <a:tcPr/>
+                </a:tc>
+                <a:extLst>
+                  <a:ext uri="{0D108BD9-81ED-4DB2-BD59-A6C34878D82A}">
+                    <a16:rowId xmlns:a16="http://schemas.microsoft.com/office/drawing/2014/main" val="2649268109"/>
+                  </a:ext>
+                </a:extLst>
+              </a:tr>
+              <a:tr h="370840">
+                <a:tc>
+                  <a:txBody>
+                    <a:bodyPr/>
+                    <a:lstStyle/>
+                    <a:p>
+                      <a:r>
+                        <a:rPr lang="en-US" dirty="0" err="1"/>
+                        <a:t>stencilWrite</a:t>
+                      </a:r>
+                      <a:endParaRPr lang="id-ID" dirty="0"/>
+                    </a:p>
+                  </a:txBody>
+                  <a:tcPr/>
+                </a:tc>
+                <a:tc>
+                  <a:txBody>
+                    <a:bodyPr/>
+                    <a:lstStyle/>
+                    <a:p>
+                      <a:r>
+                        <a:rPr lang="en-US" dirty="0"/>
+                        <a:t>Boolean</a:t>
+                      </a:r>
+                      <a:endParaRPr lang="id-ID" dirty="0"/>
+                    </a:p>
+                  </a:txBody>
+                  <a:tcPr/>
+                </a:tc>
+                <a:tc>
+                  <a:txBody>
+                    <a:bodyPr/>
+                    <a:lstStyle/>
+                    <a:p>
+                      <a:r>
+                        <a:rPr lang="en-US" dirty="0" err="1"/>
+                        <a:t>Menulis</a:t>
+                      </a:r>
+                      <a:r>
+                        <a:rPr lang="en-US" dirty="0"/>
+                        <a:t> </a:t>
+                      </a:r>
+                      <a:r>
+                        <a:rPr lang="en-US" dirty="0" err="1"/>
+                        <a:t>ke</a:t>
+                      </a:r>
+                      <a:r>
+                        <a:rPr lang="en-US" dirty="0"/>
+                        <a:t> stencil buffer </a:t>
+                      </a:r>
+                      <a:r>
+                        <a:rPr lang="en-US" dirty="0" err="1"/>
+                        <a:t>atau</a:t>
+                      </a:r>
+                      <a:r>
+                        <a:rPr lang="en-US" dirty="0"/>
+                        <a:t> </a:t>
+                      </a:r>
+                      <a:r>
+                        <a:rPr lang="en-US" dirty="0" err="1"/>
+                        <a:t>tidak</a:t>
+                      </a:r>
+                      <a:endParaRPr lang="id-ID" dirty="0"/>
+                    </a:p>
+                  </a:txBody>
+                  <a:tcPr/>
+                </a:tc>
+                <a:extLst>
+                  <a:ext uri="{0D108BD9-81ED-4DB2-BD59-A6C34878D82A}">
+                    <a16:rowId xmlns:a16="http://schemas.microsoft.com/office/drawing/2014/main" val="96227051"/>
+                  </a:ext>
+                </a:extLst>
+              </a:tr>
+              <a:tr h="370840">
+                <a:tc>
+                  <a:txBody>
+                    <a:bodyPr/>
+                    <a:lstStyle/>
+                    <a:p>
+                      <a:r>
+                        <a:rPr lang="en-US" dirty="0" err="1"/>
+                        <a:t>stencilRef</a:t>
+                      </a:r>
+                      <a:endParaRPr lang="id-ID" dirty="0"/>
+                    </a:p>
+                  </a:txBody>
+                  <a:tcPr/>
+                </a:tc>
+                <a:tc>
+                  <a:txBody>
+                    <a:bodyPr/>
+                    <a:lstStyle/>
+                    <a:p>
+                      <a:r>
+                        <a:rPr lang="en-US" dirty="0"/>
+                        <a:t>Int</a:t>
+                      </a:r>
+                      <a:endParaRPr lang="id-ID" dirty="0"/>
+                    </a:p>
+                  </a:txBody>
+                  <a:tcPr/>
+                </a:tc>
+                <a:tc>
+                  <a:txBody>
+                    <a:bodyPr/>
+                    <a:lstStyle/>
+                    <a:p>
+                      <a:r>
+                        <a:rPr lang="en-US" dirty="0"/>
+                        <a:t>Nilai stencil material</a:t>
+                      </a:r>
+                      <a:endParaRPr lang="id-ID" dirty="0"/>
+                    </a:p>
+                  </a:txBody>
+                  <a:tcPr/>
+                </a:tc>
+                <a:extLst>
+                  <a:ext uri="{0D108BD9-81ED-4DB2-BD59-A6C34878D82A}">
+                    <a16:rowId xmlns:a16="http://schemas.microsoft.com/office/drawing/2014/main" val="3407591667"/>
+                  </a:ext>
+                </a:extLst>
+              </a:tr>
+              <a:tr h="370840">
+                <a:tc>
+                  <a:txBody>
+                    <a:bodyPr/>
+                    <a:lstStyle/>
+                    <a:p>
+                      <a:r>
+                        <a:rPr lang="en-US" dirty="0" err="1"/>
+                        <a:t>stencilWriteMask</a:t>
+                      </a:r>
+                      <a:endParaRPr lang="id-ID" dirty="0"/>
+                    </a:p>
+                  </a:txBody>
+                  <a:tcPr/>
+                </a:tc>
+                <a:tc>
+                  <a:txBody>
+                    <a:bodyPr/>
+                    <a:lstStyle/>
+                    <a:p>
+                      <a:r>
+                        <a:rPr lang="en-US" dirty="0"/>
+                        <a:t>Int</a:t>
+                      </a:r>
+                      <a:endParaRPr lang="id-ID" dirty="0"/>
+                    </a:p>
+                  </a:txBody>
+                  <a:tcPr/>
+                </a:tc>
+                <a:tc>
+                  <a:txBody>
+                    <a:bodyPr/>
+                    <a:lstStyle/>
+                    <a:p>
+                      <a:r>
+                        <a:rPr lang="en-US" dirty="0"/>
+                        <a:t>Mask bit </a:t>
+                      </a:r>
+                      <a:r>
+                        <a:rPr lang="en-US" dirty="0" err="1"/>
+                        <a:t>saat</a:t>
+                      </a:r>
+                      <a:r>
+                        <a:rPr lang="en-US" dirty="0"/>
+                        <a:t> </a:t>
+                      </a:r>
+                      <a:r>
+                        <a:rPr lang="en-US" dirty="0" err="1"/>
+                        <a:t>ditulis</a:t>
+                      </a:r>
+                      <a:endParaRPr lang="id-ID" dirty="0"/>
+                    </a:p>
+                  </a:txBody>
+                  <a:tcPr/>
+                </a:tc>
+                <a:extLst>
+                  <a:ext uri="{0D108BD9-81ED-4DB2-BD59-A6C34878D82A}">
+                    <a16:rowId xmlns:a16="http://schemas.microsoft.com/office/drawing/2014/main" val="2978169070"/>
+                  </a:ext>
+                </a:extLst>
+              </a:tr>
+              <a:tr h="370840">
+                <a:tc>
+                  <a:txBody>
+                    <a:bodyPr/>
+                    <a:lstStyle/>
+                    <a:p>
+                      <a:r>
+                        <a:rPr lang="en-US" dirty="0" err="1"/>
+                        <a:t>stencilFuncMask</a:t>
+                      </a:r>
+                      <a:endParaRPr lang="id-ID" dirty="0"/>
+                    </a:p>
+                  </a:txBody>
+                  <a:tcPr/>
+                </a:tc>
+                <a:tc>
+                  <a:txBody>
+                    <a:bodyPr/>
+                    <a:lstStyle/>
+                    <a:p>
+                      <a:r>
+                        <a:rPr lang="en-US" dirty="0"/>
+                        <a:t>Int</a:t>
+                      </a:r>
+                      <a:endParaRPr lang="id-ID" dirty="0"/>
+                    </a:p>
+                  </a:txBody>
+                  <a:tcPr/>
+                </a:tc>
+                <a:tc>
+                  <a:txBody>
+                    <a:bodyPr/>
+                    <a:lstStyle/>
+                    <a:p>
+                      <a:r>
+                        <a:rPr lang="en-US" dirty="0"/>
+                        <a:t>Mask bit </a:t>
+                      </a:r>
+                      <a:r>
+                        <a:rPr lang="en-US" dirty="0" err="1"/>
+                        <a:t>saat</a:t>
+                      </a:r>
+                      <a:r>
+                        <a:rPr lang="en-US" dirty="0"/>
+                        <a:t> compare</a:t>
+                      </a:r>
+                      <a:endParaRPr lang="id-ID" dirty="0"/>
+                    </a:p>
+                  </a:txBody>
+                  <a:tcPr/>
+                </a:tc>
+                <a:extLst>
+                  <a:ext uri="{0D108BD9-81ED-4DB2-BD59-A6C34878D82A}">
+                    <a16:rowId xmlns:a16="http://schemas.microsoft.com/office/drawing/2014/main" val="1353837677"/>
+                  </a:ext>
+                </a:extLst>
+              </a:tr>
+              <a:tr h="370840">
+                <a:tc>
+                  <a:txBody>
+                    <a:bodyPr/>
+                    <a:lstStyle/>
+                    <a:p>
+                      <a:r>
+                        <a:rPr lang="en-US" dirty="0" err="1"/>
+                        <a:t>stencilFunc</a:t>
+                      </a:r>
+                      <a:endParaRPr lang="id-ID" dirty="0"/>
+                    </a:p>
+                  </a:txBody>
+                  <a:tcPr/>
+                </a:tc>
+                <a:tc>
+                  <a:txBody>
+                    <a:bodyPr/>
+                    <a:lstStyle/>
+                    <a:p>
+                      <a:r>
+                        <a:rPr lang="en-US" dirty="0"/>
+                        <a:t>Int (</a:t>
+                      </a:r>
+                      <a:r>
+                        <a:rPr lang="en-US" dirty="0" err="1"/>
+                        <a:t>Fungsi</a:t>
+                      </a:r>
+                      <a:r>
+                        <a:rPr lang="en-US" dirty="0"/>
+                        <a:t> Compare)</a:t>
+                      </a:r>
+                      <a:endParaRPr lang="id-ID" dirty="0"/>
+                    </a:p>
+                  </a:txBody>
+                  <a:tcPr/>
+                </a:tc>
+                <a:tc>
+                  <a:txBody>
+                    <a:bodyPr/>
+                    <a:lstStyle/>
+                    <a:p>
+                      <a:r>
+                        <a:rPr lang="en-US" dirty="0" err="1"/>
+                        <a:t>Fungsi</a:t>
+                      </a:r>
+                      <a:r>
+                        <a:rPr lang="en-US" dirty="0"/>
+                        <a:t> compare stencil</a:t>
+                      </a:r>
+                      <a:endParaRPr lang="id-ID" dirty="0"/>
+                    </a:p>
+                  </a:txBody>
+                  <a:tcPr/>
+                </a:tc>
+                <a:extLst>
+                  <a:ext uri="{0D108BD9-81ED-4DB2-BD59-A6C34878D82A}">
+                    <a16:rowId xmlns:a16="http://schemas.microsoft.com/office/drawing/2014/main" val="1245360895"/>
+                  </a:ext>
+                </a:extLst>
+              </a:tr>
+            </a:tbl>
+          </a:graphicData>
+        </a:graphic>
+      </p:graphicFrame>
+    </p:spTree>
+    <p:extLst>
+      <p:ext uri="{BB962C8B-B14F-4D97-AF65-F5344CB8AC3E}">
+        <p14:creationId xmlns:p14="http://schemas.microsoft.com/office/powerpoint/2010/main" val="1762101878"/>
+      </p:ext>
+    </p:extLst>
+  </p:cSld>
+  <p:clrMapOvr>
+    <a:masterClrMapping/>
+  </p:clrMapOvr>
+</p:sld>
+</file>
+
+<file path=ppt/slides/slide7.xml><?xml version="1.0" encoding="utf-8"?>
+<p:sld xmlns:a="http://schemas.openxmlformats.org/drawingml/2006/main" xmlns:r="http://schemas.openxmlformats.org/officeDocument/2006/relationships" xmlns:p="http://schemas.openxmlformats.org/presentationml/2006/main">
+  <p:cSld>
+    <p:spTree>
+      <p:nvGrpSpPr>
+        <p:cNvPr id="1" name=""/>
+        <p:cNvGrpSpPr/>
+        <p:nvPr/>
+      </p:nvGrpSpPr>
+      <p:grpSpPr>
+        <a:xfrm>
+          <a:off x="0" y="0"/>
+          <a:ext cx="0" cy="0"/>
+          <a:chOff x="0" y="0"/>
+          <a:chExt cx="0" cy="0"/>
+        </a:xfrm>
+      </p:grpSpPr>
+      <p:sp>
+        <p:nvSpPr>
+          <p:cNvPr id="2" name="Title 1">
+            <a:extLst>
+              <a:ext uri="{FF2B5EF4-FFF2-40B4-BE49-F238E27FC236}">
+                <a16:creationId xmlns:a16="http://schemas.microsoft.com/office/drawing/2014/main" id="{B8015D6F-3417-4407-AABE-C570F3C28DA0}"/>
+              </a:ext>
+            </a:extLst>
+          </p:cNvPr>
+          <p:cNvSpPr>
+            <a:spLocks noGrp="1"/>
+          </p:cNvSpPr>
+          <p:nvPr>
+            <p:ph type="title"/>
+          </p:nvPr>
+        </p:nvSpPr>
+        <p:spPr/>
+        <p:txBody>
+          <a:bodyPr/>
+          <a:lstStyle/>
+          <a:p>
+            <a:r>
+              <a:rPr lang="en-US" dirty="0"/>
+              <a:t>Stencil buffer</a:t>
+            </a:r>
+            <a:endParaRPr lang="id-ID" dirty="0"/>
+          </a:p>
+        </p:txBody>
+      </p:sp>
+      <p:sp>
+        <p:nvSpPr>
+          <p:cNvPr id="3" name="Content Placeholder 2">
+            <a:extLst>
+              <a:ext uri="{FF2B5EF4-FFF2-40B4-BE49-F238E27FC236}">
+                <a16:creationId xmlns:a16="http://schemas.microsoft.com/office/drawing/2014/main" id="{08FFA316-772F-4C27-8FC7-BC6E64D1506E}"/>
+              </a:ext>
+            </a:extLst>
+          </p:cNvPr>
+          <p:cNvSpPr>
+            <a:spLocks noGrp="1"/>
+          </p:cNvSpPr>
+          <p:nvPr>
+            <p:ph idx="1"/>
+          </p:nvPr>
+        </p:nvSpPr>
+        <p:spPr/>
+        <p:txBody>
+          <a:bodyPr/>
+          <a:lstStyle/>
+          <a:p>
+            <a:endParaRPr lang="id-ID" dirty="0"/>
+          </a:p>
+        </p:txBody>
+      </p:sp>
+      <p:graphicFrame>
+        <p:nvGraphicFramePr>
+          <p:cNvPr id="5" name="Table 4">
+            <a:extLst>
+              <a:ext uri="{FF2B5EF4-FFF2-40B4-BE49-F238E27FC236}">
+                <a16:creationId xmlns:a16="http://schemas.microsoft.com/office/drawing/2014/main" id="{ED44E874-EBE8-4820-9B6C-A96652EC89FC}"/>
+              </a:ext>
+            </a:extLst>
+          </p:cNvPr>
+          <p:cNvGraphicFramePr>
+            <a:graphicFrameLocks noGrp="1"/>
+          </p:cNvGraphicFramePr>
+          <p:nvPr>
+            <p:extLst>
+              <p:ext uri="{D42A27DB-BD31-4B8C-83A1-F6EECF244321}">
+                <p14:modId xmlns:p14="http://schemas.microsoft.com/office/powerpoint/2010/main" val="3838808329"/>
+              </p:ext>
+            </p:extLst>
+          </p:nvPr>
+        </p:nvGraphicFramePr>
+        <p:xfrm>
+          <a:off x="1095470" y="2108201"/>
+          <a:ext cx="10058400" cy="2839720"/>
+        </p:xfrm>
+        <a:graphic>
+          <a:graphicData uri="http://schemas.openxmlformats.org/drawingml/2006/table">
+            <a:tbl>
+              <a:tblPr firstRow="1" bandRow="1">
+                <a:tableStyleId>{0E3FDE45-AF77-4B5C-9715-49D594BDF05E}</a:tableStyleId>
+              </a:tblPr>
+              <a:tblGrid>
+                <a:gridCol w="3352800">
+                  <a:extLst>
+                    <a:ext uri="{9D8B030D-6E8A-4147-A177-3AD203B41FA5}">
+                      <a16:colId xmlns:a16="http://schemas.microsoft.com/office/drawing/2014/main" val="1707341823"/>
+                    </a:ext>
+                  </a:extLst>
+                </a:gridCol>
+                <a:gridCol w="3352800">
+                  <a:extLst>
+                    <a:ext uri="{9D8B030D-6E8A-4147-A177-3AD203B41FA5}">
+                      <a16:colId xmlns:a16="http://schemas.microsoft.com/office/drawing/2014/main" val="2852480182"/>
+                    </a:ext>
+                  </a:extLst>
+                </a:gridCol>
+                <a:gridCol w="3352800">
+                  <a:extLst>
+                    <a:ext uri="{9D8B030D-6E8A-4147-A177-3AD203B41FA5}">
+                      <a16:colId xmlns:a16="http://schemas.microsoft.com/office/drawing/2014/main" val="523332350"/>
+                    </a:ext>
+                  </a:extLst>
+                </a:gridCol>
+              </a:tblGrid>
+              <a:tr h="370840">
+                <a:tc>
+                  <a:txBody>
+                    <a:bodyPr/>
+                    <a:lstStyle/>
+                    <a:p>
+                      <a:pPr algn="ctr"/>
+                      <a:r>
+                        <a:rPr lang="en-US" dirty="0" err="1"/>
+                        <a:t>Properti</a:t>
+                      </a:r>
+                      <a:endParaRPr lang="id-ID" dirty="0"/>
+                    </a:p>
+                  </a:txBody>
+                  <a:tcPr/>
+                </a:tc>
+                <a:tc>
+                  <a:txBody>
+                    <a:bodyPr/>
+                    <a:lstStyle/>
+                    <a:p>
+                      <a:pPr algn="ctr"/>
+                      <a:r>
+                        <a:rPr lang="en-US" dirty="0" err="1"/>
+                        <a:t>Tipe</a:t>
+                      </a:r>
+                      <a:endParaRPr lang="id-ID" dirty="0"/>
+                    </a:p>
+                  </a:txBody>
+                  <a:tcPr/>
+                </a:tc>
+                <a:tc>
+                  <a:txBody>
+                    <a:bodyPr/>
+                    <a:lstStyle/>
+                    <a:p>
+                      <a:pPr algn="ctr"/>
+                      <a:r>
+                        <a:rPr lang="en-US" dirty="0" err="1"/>
+                        <a:t>Fungsi</a:t>
+                      </a:r>
+                      <a:endParaRPr lang="id-ID" dirty="0"/>
+                    </a:p>
+                  </a:txBody>
+                  <a:tcPr/>
+                </a:tc>
+                <a:extLst>
+                  <a:ext uri="{0D108BD9-81ED-4DB2-BD59-A6C34878D82A}">
+                    <a16:rowId xmlns:a16="http://schemas.microsoft.com/office/drawing/2014/main" val="2649268109"/>
+                  </a:ext>
+                </a:extLst>
+              </a:tr>
+              <a:tr h="370840">
+                <a:tc>
+                  <a:txBody>
+                    <a:bodyPr/>
+                    <a:lstStyle/>
+                    <a:p>
+                      <a:r>
+                        <a:rPr lang="en-US" dirty="0" err="1"/>
+                        <a:t>stencilFail</a:t>
+                      </a:r>
+                      <a:endParaRPr lang="id-ID" dirty="0"/>
+                    </a:p>
+                  </a:txBody>
+                  <a:tcPr/>
+                </a:tc>
+                <a:tc>
+                  <a:txBody>
+                    <a:bodyPr/>
+                    <a:lstStyle/>
+                    <a:p>
+                      <a:r>
+                        <a:rPr lang="en-US" dirty="0"/>
+                        <a:t>Int (</a:t>
+                      </a:r>
+                      <a:r>
+                        <a:rPr lang="en-US" dirty="0" err="1"/>
+                        <a:t>Fungsi</a:t>
+                      </a:r>
+                      <a:r>
+                        <a:rPr lang="en-US" dirty="0"/>
+                        <a:t> </a:t>
+                      </a:r>
+                      <a:r>
+                        <a:rPr lang="en-US" dirty="0" err="1"/>
+                        <a:t>Operasi</a:t>
+                      </a:r>
+                      <a:r>
+                        <a:rPr lang="en-US" dirty="0"/>
+                        <a:t>)</a:t>
+                      </a:r>
+                      <a:endParaRPr lang="id-ID" dirty="0"/>
+                    </a:p>
+                  </a:txBody>
+                  <a:tcPr/>
+                </a:tc>
+                <a:tc>
+                  <a:txBody>
+                    <a:bodyPr/>
+                    <a:lstStyle/>
+                    <a:p>
+                      <a:r>
+                        <a:rPr lang="en-US" dirty="0" err="1"/>
+                        <a:t>Fungsi</a:t>
+                      </a:r>
+                      <a:r>
+                        <a:rPr lang="en-US" dirty="0"/>
+                        <a:t> yang </a:t>
+                      </a:r>
+                      <a:r>
+                        <a:rPr lang="en-US" dirty="0" err="1"/>
+                        <a:t>akan</a:t>
+                      </a:r>
+                      <a:r>
+                        <a:rPr lang="en-US" dirty="0"/>
+                        <a:t> </a:t>
+                      </a:r>
+                      <a:r>
+                        <a:rPr lang="en-US" dirty="0" err="1"/>
+                        <a:t>dieksekusi</a:t>
+                      </a:r>
+                      <a:r>
+                        <a:rPr lang="en-US" dirty="0"/>
+                        <a:t> </a:t>
+                      </a:r>
+                      <a:r>
+                        <a:rPr lang="en-US" dirty="0" err="1"/>
+                        <a:t>jika</a:t>
+                      </a:r>
+                      <a:r>
+                        <a:rPr lang="en-US" dirty="0"/>
+                        <a:t> </a:t>
+                      </a:r>
+                      <a:r>
+                        <a:rPr lang="en-US" dirty="0" err="1"/>
+                        <a:t>stencilCompare</a:t>
+                      </a:r>
+                      <a:r>
+                        <a:rPr lang="en-US" dirty="0"/>
+                        <a:t> return false</a:t>
+                      </a:r>
+                      <a:endParaRPr lang="id-ID" dirty="0"/>
+                    </a:p>
+                  </a:txBody>
+                  <a:tcPr/>
+                </a:tc>
+                <a:extLst>
+                  <a:ext uri="{0D108BD9-81ED-4DB2-BD59-A6C34878D82A}">
+                    <a16:rowId xmlns:a16="http://schemas.microsoft.com/office/drawing/2014/main" val="96227051"/>
+                  </a:ext>
+                </a:extLst>
+              </a:tr>
+              <a:tr h="370840">
+                <a:tc>
+                  <a:txBody>
+                    <a:bodyPr/>
+                    <a:lstStyle/>
+                    <a:p>
+                      <a:r>
+                        <a:rPr lang="en-US" dirty="0" err="1"/>
+                        <a:t>stencilZFail</a:t>
+                      </a:r>
+                      <a:endParaRPr lang="id-ID" dirty="0"/>
+                    </a:p>
+                  </a:txBody>
+                  <a:tcPr/>
+                </a:tc>
+                <a:tc>
+                  <a:txBody>
+                    <a:bodyPr/>
+                    <a:lstStyle/>
+                    <a:p>
+                      <a:r>
+                        <a:rPr lang="en-US" dirty="0"/>
+                        <a:t>Int (</a:t>
+                      </a:r>
+                      <a:r>
+                        <a:rPr lang="en-US" dirty="0" err="1"/>
+                        <a:t>Fungsi</a:t>
+                      </a:r>
+                      <a:r>
+                        <a:rPr lang="en-US" dirty="0"/>
+                        <a:t> </a:t>
+                      </a:r>
+                      <a:r>
+                        <a:rPr lang="en-US" dirty="0" err="1"/>
+                        <a:t>Operasi</a:t>
+                      </a:r>
+                      <a:r>
+                        <a:rPr lang="en-US" dirty="0"/>
+                        <a:t>)</a:t>
+                      </a:r>
+                      <a:endParaRPr lang="id-ID" dirty="0"/>
+                    </a:p>
+                  </a:txBody>
+                  <a:tcPr/>
+                </a:tc>
+                <a:tc>
+                  <a:txBody>
+                    <a:bodyPr/>
+                    <a:lstStyle/>
+                    <a:p>
+                      <a:r>
+                        <a:rPr lang="en-US" dirty="0" err="1"/>
+                        <a:t>NilaFungsi</a:t>
+                      </a:r>
+                      <a:r>
+                        <a:rPr lang="en-US" dirty="0"/>
+                        <a:t> yang </a:t>
+                      </a:r>
+                      <a:r>
+                        <a:rPr lang="en-US" dirty="0" err="1"/>
+                        <a:t>akan</a:t>
+                      </a:r>
+                      <a:r>
+                        <a:rPr lang="en-US" dirty="0"/>
+                        <a:t> </a:t>
+                      </a:r>
+                      <a:r>
+                        <a:rPr lang="en-US" dirty="0" err="1"/>
+                        <a:t>dieksekusi</a:t>
+                      </a:r>
+                      <a:r>
+                        <a:rPr lang="en-US" dirty="0"/>
+                        <a:t> </a:t>
+                      </a:r>
+                      <a:r>
+                        <a:rPr lang="en-US" dirty="0" err="1"/>
+                        <a:t>jika</a:t>
+                      </a:r>
+                      <a:r>
+                        <a:rPr lang="en-US" dirty="0"/>
+                        <a:t> </a:t>
+                      </a:r>
+                      <a:r>
+                        <a:rPr lang="en-US" dirty="0" err="1"/>
+                        <a:t>stencilCompare</a:t>
+                      </a:r>
+                      <a:r>
+                        <a:rPr lang="en-US" dirty="0"/>
+                        <a:t> return false dan </a:t>
+                      </a:r>
+                      <a:r>
+                        <a:rPr lang="en-US" dirty="0" err="1"/>
+                        <a:t>depthTest</a:t>
+                      </a:r>
+                      <a:r>
+                        <a:rPr lang="en-US" dirty="0"/>
+                        <a:t> false</a:t>
+                      </a:r>
+                      <a:endParaRPr lang="id-ID" dirty="0"/>
+                    </a:p>
+                  </a:txBody>
+                  <a:tcPr/>
+                </a:tc>
+                <a:extLst>
+                  <a:ext uri="{0D108BD9-81ED-4DB2-BD59-A6C34878D82A}">
+                    <a16:rowId xmlns:a16="http://schemas.microsoft.com/office/drawing/2014/main" val="3407591667"/>
+                  </a:ext>
+                </a:extLst>
+              </a:tr>
+              <a:tr h="370840">
+                <a:tc>
+                  <a:txBody>
+                    <a:bodyPr/>
+                    <a:lstStyle/>
+                    <a:p>
+                      <a:r>
+                        <a:rPr lang="en-US" dirty="0" err="1"/>
+                        <a:t>stencilZPass</a:t>
+                      </a:r>
+                      <a:endParaRPr lang="id-ID" dirty="0"/>
+                    </a:p>
+                  </a:txBody>
+                  <a:tcPr/>
+                </a:tc>
+                <a:tc>
+                  <a:txBody>
+                    <a:bodyPr/>
+                    <a:lstStyle/>
+                    <a:p>
+                      <a:r>
+                        <a:rPr lang="en-US" dirty="0"/>
+                        <a:t>Int (</a:t>
+                      </a:r>
+                      <a:r>
+                        <a:rPr lang="en-US" dirty="0" err="1"/>
+                        <a:t>Fungsi</a:t>
+                      </a:r>
+                      <a:r>
+                        <a:rPr lang="en-US" dirty="0"/>
+                        <a:t> </a:t>
+                      </a:r>
+                      <a:r>
+                        <a:rPr lang="en-US" dirty="0" err="1"/>
+                        <a:t>Operasi</a:t>
+                      </a:r>
+                      <a:r>
+                        <a:rPr lang="en-US" dirty="0"/>
+                        <a:t>)</a:t>
+                      </a:r>
+                      <a:endParaRPr lang="id-ID" dirty="0"/>
+                    </a:p>
+                  </a:txBody>
+                  <a:tcPr/>
+                </a:tc>
+                <a:tc>
+                  <a:txBody>
+                    <a:bodyPr/>
+                    <a:lstStyle/>
+                    <a:p>
+                      <a:r>
+                        <a:rPr lang="en-US" dirty="0" err="1"/>
+                        <a:t>Fungsi</a:t>
+                      </a:r>
+                      <a:r>
+                        <a:rPr lang="en-US" dirty="0"/>
+                        <a:t> yang </a:t>
+                      </a:r>
+                      <a:r>
+                        <a:rPr lang="en-US" dirty="0" err="1"/>
+                        <a:t>akan</a:t>
+                      </a:r>
+                      <a:r>
+                        <a:rPr lang="en-US" dirty="0"/>
+                        <a:t> </a:t>
+                      </a:r>
+                      <a:r>
+                        <a:rPr lang="en-US" dirty="0" err="1"/>
+                        <a:t>dieksekusi</a:t>
+                      </a:r>
+                      <a:r>
+                        <a:rPr lang="en-US" dirty="0"/>
+                        <a:t> </a:t>
+                      </a:r>
+                      <a:r>
+                        <a:rPr lang="en-US" dirty="0" err="1"/>
+                        <a:t>jika</a:t>
+                      </a:r>
+                      <a:r>
+                        <a:rPr lang="en-US" dirty="0"/>
+                        <a:t> </a:t>
+                      </a:r>
+                      <a:r>
+                        <a:rPr lang="en-US" dirty="0" err="1"/>
+                        <a:t>stencilCompare</a:t>
+                      </a:r>
+                      <a:r>
+                        <a:rPr lang="en-US" dirty="0"/>
+                        <a:t> return false dan </a:t>
+                      </a:r>
+                      <a:r>
+                        <a:rPr lang="en-US" dirty="0" err="1"/>
+                        <a:t>depthTest</a:t>
+                      </a:r>
+                      <a:r>
+                        <a:rPr lang="en-US" dirty="0"/>
+                        <a:t> true</a:t>
+                      </a:r>
+                      <a:endParaRPr lang="id-ID" dirty="0"/>
+                    </a:p>
+                  </a:txBody>
+                  <a:tcPr/>
+                </a:tc>
+                <a:extLst>
+                  <a:ext uri="{0D108BD9-81ED-4DB2-BD59-A6C34878D82A}">
+                    <a16:rowId xmlns:a16="http://schemas.microsoft.com/office/drawing/2014/main" val="2978169070"/>
+                  </a:ext>
+                </a:extLst>
+              </a:tr>
+            </a:tbl>
+          </a:graphicData>
+        </a:graphic>
+      </p:graphicFrame>
+    </p:spTree>
+    <p:extLst>
+      <p:ext uri="{BB962C8B-B14F-4D97-AF65-F5344CB8AC3E}">
+        <p14:creationId xmlns:p14="http://schemas.microsoft.com/office/powerpoint/2010/main" val="1958301305"/>
+      </p:ext>
+    </p:extLst>
+  </p:cSld>
+  <p:clrMapOvr>
+    <a:masterClrMapping/>
+  </p:clrMapOvr>
+</p:sld>
+</file>
+
+<file path=ppt/slides/slide8.xml><?xml version="1.0" encoding="utf-8"?>
+<p:sld xmlns:a="http://schemas.openxmlformats.org/drawingml/2006/main" xmlns:r="http://schemas.openxmlformats.org/officeDocument/2006/relationships" xmlns:p="http://schemas.openxmlformats.org/presentationml/2006/main">
+  <p:cSld>
+    <p:spTree>
+      <p:nvGrpSpPr>
+        <p:cNvPr id="1" name=""/>
+        <p:cNvGrpSpPr/>
+        <p:nvPr/>
+      </p:nvGrpSpPr>
+      <p:grpSpPr>
+        <a:xfrm>
+          <a:off x="0" y="0"/>
+          <a:ext cx="0" cy="0"/>
+          <a:chOff x="0" y="0"/>
+          <a:chExt cx="0" cy="0"/>
+        </a:xfrm>
+      </p:grpSpPr>
+      <p:sp>
+        <p:nvSpPr>
+          <p:cNvPr id="2" name="Title 1">
+            <a:extLst>
+              <a:ext uri="{FF2B5EF4-FFF2-40B4-BE49-F238E27FC236}">
+                <a16:creationId xmlns:a16="http://schemas.microsoft.com/office/drawing/2014/main" id="{34ABCDF0-8169-4AA3-9D2F-5CCBB2D69AC4}"/>
+              </a:ext>
+            </a:extLst>
+          </p:cNvPr>
+          <p:cNvSpPr>
+            <a:spLocks noGrp="1"/>
+          </p:cNvSpPr>
+          <p:nvPr>
+            <p:ph type="title"/>
+          </p:nvPr>
+        </p:nvSpPr>
+        <p:spPr/>
+        <p:txBody>
+          <a:bodyPr/>
+          <a:lstStyle/>
+          <a:p>
+            <a:r>
+              <a:rPr lang="en-US" dirty="0" err="1"/>
+              <a:t>Fungsi</a:t>
+            </a:r>
+            <a:r>
+              <a:rPr lang="en-US" dirty="0"/>
+              <a:t> compare stencil</a:t>
+            </a:r>
+            <a:endParaRPr lang="id-ID" dirty="0"/>
+          </a:p>
+        </p:txBody>
+      </p:sp>
+      <p:sp>
+        <p:nvSpPr>
+          <p:cNvPr id="3" name="Content Placeholder 2">
+            <a:extLst>
+              <a:ext uri="{FF2B5EF4-FFF2-40B4-BE49-F238E27FC236}">
+                <a16:creationId xmlns:a16="http://schemas.microsoft.com/office/drawing/2014/main" id="{9F8B98AB-4075-40D1-9A1B-0315FCD8F77D}"/>
+              </a:ext>
+            </a:extLst>
+          </p:cNvPr>
+          <p:cNvSpPr>
+            <a:spLocks noGrp="1"/>
+          </p:cNvSpPr>
+          <p:nvPr>
+            <p:ph idx="1"/>
+          </p:nvPr>
+        </p:nvSpPr>
+        <p:spPr/>
+        <p:txBody>
+          <a:bodyPr>
+            <a:normAutofit lnSpcReduction="10000"/>
+          </a:bodyPr>
+          <a:lstStyle/>
+          <a:p>
+            <a:pPr>
+              <a:buFont typeface="Wingdings" panose="05000000000000000000" pitchFamily="2" charset="2"/>
+              <a:buChar char="§"/>
+            </a:pPr>
+            <a:r>
+              <a:rPr lang="id-ID" dirty="0" err="1"/>
+              <a:t>NeverStencilFunc</a:t>
+            </a:r>
+            <a:endParaRPr lang="id-ID" dirty="0"/>
+          </a:p>
+          <a:p>
+            <a:pPr>
+              <a:buFont typeface="Wingdings" panose="05000000000000000000" pitchFamily="2" charset="2"/>
+              <a:buChar char="§"/>
+            </a:pPr>
+            <a:r>
+              <a:rPr lang="id-ID" dirty="0" err="1"/>
+              <a:t>LessStencilFunc</a:t>
+            </a:r>
+            <a:endParaRPr lang="id-ID" dirty="0"/>
+          </a:p>
+          <a:p>
+            <a:pPr>
+              <a:buFont typeface="Wingdings" panose="05000000000000000000" pitchFamily="2" charset="2"/>
+              <a:buChar char="§"/>
+            </a:pPr>
+            <a:r>
+              <a:rPr lang="id-ID" dirty="0" err="1"/>
+              <a:t>EqualStencilFunc</a:t>
+            </a:r>
+            <a:endParaRPr lang="id-ID" dirty="0"/>
+          </a:p>
+          <a:p>
+            <a:pPr>
+              <a:buFont typeface="Wingdings" panose="05000000000000000000" pitchFamily="2" charset="2"/>
+              <a:buChar char="§"/>
+            </a:pPr>
+            <a:r>
+              <a:rPr lang="id-ID" dirty="0" err="1"/>
+              <a:t>LessEqualStencilFunc</a:t>
+            </a:r>
+            <a:endParaRPr lang="id-ID" dirty="0"/>
+          </a:p>
+          <a:p>
+            <a:pPr>
+              <a:buFont typeface="Wingdings" panose="05000000000000000000" pitchFamily="2" charset="2"/>
+              <a:buChar char="§"/>
+            </a:pPr>
+            <a:r>
+              <a:rPr lang="id-ID" dirty="0" err="1"/>
+              <a:t>GreaterStencilFunc</a:t>
+            </a:r>
+            <a:endParaRPr lang="id-ID" dirty="0"/>
+          </a:p>
+          <a:p>
+            <a:pPr>
+              <a:buFont typeface="Wingdings" panose="05000000000000000000" pitchFamily="2" charset="2"/>
+              <a:buChar char="§"/>
+            </a:pPr>
+            <a:r>
+              <a:rPr lang="id-ID" dirty="0" err="1"/>
+              <a:t>NotEqualStencilFunc</a:t>
+            </a:r>
+            <a:endParaRPr lang="id-ID" dirty="0"/>
+          </a:p>
+          <a:p>
+            <a:pPr>
+              <a:buFont typeface="Wingdings" panose="05000000000000000000" pitchFamily="2" charset="2"/>
+              <a:buChar char="§"/>
+            </a:pPr>
+            <a:r>
+              <a:rPr lang="id-ID" dirty="0" err="1"/>
+              <a:t>GreaterEqualStencilFunc</a:t>
+            </a:r>
+            <a:endParaRPr lang="id-ID" dirty="0"/>
+          </a:p>
+          <a:p>
+            <a:pPr>
+              <a:buFont typeface="Wingdings" panose="05000000000000000000" pitchFamily="2" charset="2"/>
+              <a:buChar char="§"/>
+            </a:pPr>
+            <a:r>
+              <a:rPr lang="id-ID" dirty="0" err="1"/>
+              <a:t>AlwaysStencilFunc</a:t>
+            </a:r>
+            <a:endParaRPr lang="id-ID" dirty="0"/>
+          </a:p>
+        </p:txBody>
+      </p:sp>
+    </p:spTree>
+    <p:extLst>
+      <p:ext uri="{BB962C8B-B14F-4D97-AF65-F5344CB8AC3E}">
+        <p14:creationId xmlns:p14="http://schemas.microsoft.com/office/powerpoint/2010/main" val="2331464797"/>
+      </p:ext>
+    </p:extLst>
+  </p:cSld>
+  <p:clrMapOvr>
+    <a:masterClrMapping/>
+  </p:clrMapOvr>
+</p:sld>
+</file>
+
+<file path=ppt/slides/slide9.xml><?xml version="1.0" encoding="utf-8"?>
+<p:sld xmlns:a="http://schemas.openxmlformats.org/drawingml/2006/main" xmlns:r="http://schemas.openxmlformats.org/officeDocument/2006/relationships" xmlns:p="http://schemas.openxmlformats.org/presentationml/2006/main">
+  <p:cSld>
+    <p:spTree>
+      <p:nvGrpSpPr>
+        <p:cNvPr id="1" name=""/>
+        <p:cNvGrpSpPr/>
+        <p:nvPr/>
+      </p:nvGrpSpPr>
+      <p:grpSpPr>
+        <a:xfrm>
+          <a:off x="0" y="0"/>
+          <a:ext cx="0" cy="0"/>
+          <a:chOff x="0" y="0"/>
+          <a:chExt cx="0" cy="0"/>
+        </a:xfrm>
+      </p:grpSpPr>
+      <p:sp>
+        <p:nvSpPr>
+          <p:cNvPr id="2" name="Title 1">
+            <a:extLst>
+              <a:ext uri="{FF2B5EF4-FFF2-40B4-BE49-F238E27FC236}">
+                <a16:creationId xmlns:a16="http://schemas.microsoft.com/office/drawing/2014/main" id="{01B129BE-8485-4418-B478-735887139E5E}"/>
+              </a:ext>
+            </a:extLst>
+          </p:cNvPr>
+          <p:cNvSpPr>
+            <a:spLocks noGrp="1"/>
+          </p:cNvSpPr>
+          <p:nvPr>
+            <p:ph type="title"/>
+          </p:nvPr>
+        </p:nvSpPr>
+        <p:spPr/>
+        <p:txBody>
+          <a:bodyPr/>
+          <a:lstStyle/>
+          <a:p>
+            <a:r>
+              <a:rPr lang="en-US" dirty="0" err="1"/>
+              <a:t>Fungsi</a:t>
+            </a:r>
+            <a:r>
+              <a:rPr lang="en-US" dirty="0"/>
+              <a:t> </a:t>
+            </a:r>
+            <a:r>
+              <a:rPr lang="en-US" dirty="0" err="1"/>
+              <a:t>operasi</a:t>
+            </a:r>
+            <a:r>
+              <a:rPr lang="en-US" dirty="0"/>
+              <a:t> stencil</a:t>
+            </a:r>
+            <a:endParaRPr lang="id-ID" dirty="0"/>
+          </a:p>
+        </p:txBody>
+      </p:sp>
+      <p:sp>
+        <p:nvSpPr>
+          <p:cNvPr id="3" name="Content Placeholder 2">
+            <a:extLst>
+              <a:ext uri="{FF2B5EF4-FFF2-40B4-BE49-F238E27FC236}">
+                <a16:creationId xmlns:a16="http://schemas.microsoft.com/office/drawing/2014/main" id="{EF0C10D3-039B-482B-A352-0866A7E8BAED}"/>
+              </a:ext>
+            </a:extLst>
+          </p:cNvPr>
+          <p:cNvSpPr>
+            <a:spLocks noGrp="1"/>
+          </p:cNvSpPr>
+          <p:nvPr>
+            <p:ph idx="1"/>
+          </p:nvPr>
+        </p:nvSpPr>
+        <p:spPr/>
+        <p:txBody>
+          <a:bodyPr>
+            <a:normAutofit lnSpcReduction="10000"/>
+          </a:bodyPr>
+          <a:lstStyle/>
+          <a:p>
+            <a:pPr>
+              <a:buFont typeface="Wingdings" panose="05000000000000000000" pitchFamily="2" charset="2"/>
+              <a:buChar char="§"/>
+            </a:pPr>
+            <a:r>
+              <a:rPr lang="id-ID" dirty="0" err="1"/>
+              <a:t>ZeroStencilOp</a:t>
+            </a:r>
+            <a:endParaRPr lang="id-ID" dirty="0"/>
+          </a:p>
+          <a:p>
+            <a:pPr>
+              <a:buFont typeface="Wingdings" panose="05000000000000000000" pitchFamily="2" charset="2"/>
+              <a:buChar char="§"/>
+            </a:pPr>
+            <a:r>
+              <a:rPr lang="id-ID" dirty="0" err="1"/>
+              <a:t>KeepStencilOp</a:t>
+            </a:r>
+            <a:endParaRPr lang="id-ID" dirty="0"/>
+          </a:p>
+          <a:p>
+            <a:pPr>
+              <a:buFont typeface="Wingdings" panose="05000000000000000000" pitchFamily="2" charset="2"/>
+              <a:buChar char="§"/>
+            </a:pPr>
+            <a:r>
+              <a:rPr lang="id-ID" dirty="0" err="1"/>
+              <a:t>ReplaceStencilOp</a:t>
+            </a:r>
+            <a:endParaRPr lang="id-ID" dirty="0"/>
+          </a:p>
+          <a:p>
+            <a:pPr>
+              <a:buFont typeface="Wingdings" panose="05000000000000000000" pitchFamily="2" charset="2"/>
+              <a:buChar char="§"/>
+            </a:pPr>
+            <a:r>
+              <a:rPr lang="id-ID" dirty="0" err="1"/>
+              <a:t>IncrementStencilOp</a:t>
+            </a:r>
+            <a:endParaRPr lang="id-ID" dirty="0"/>
+          </a:p>
+          <a:p>
+            <a:pPr>
+              <a:buFont typeface="Wingdings" panose="05000000000000000000" pitchFamily="2" charset="2"/>
+              <a:buChar char="§"/>
+            </a:pPr>
+            <a:r>
+              <a:rPr lang="id-ID" dirty="0" err="1"/>
+              <a:t>DecrementStencilOp</a:t>
+            </a:r>
+            <a:endParaRPr lang="id-ID" dirty="0"/>
+          </a:p>
+          <a:p>
+            <a:pPr>
+              <a:buFont typeface="Wingdings" panose="05000000000000000000" pitchFamily="2" charset="2"/>
+              <a:buChar char="§"/>
+            </a:pPr>
+            <a:r>
+              <a:rPr lang="id-ID" dirty="0" err="1"/>
+              <a:t>IncrementWrapStencilOp</a:t>
+            </a:r>
+            <a:endParaRPr lang="id-ID" dirty="0"/>
+          </a:p>
+          <a:p>
+            <a:pPr>
+              <a:buFont typeface="Wingdings" panose="05000000000000000000" pitchFamily="2" charset="2"/>
+              <a:buChar char="§"/>
+            </a:pPr>
+            <a:r>
+              <a:rPr lang="id-ID" dirty="0" err="1"/>
+              <a:t>DecrementWrapStencilOp</a:t>
+            </a:r>
+            <a:endParaRPr lang="id-ID" dirty="0"/>
+          </a:p>
+          <a:p>
+            <a:pPr>
+              <a:buFont typeface="Wingdings" panose="05000000000000000000" pitchFamily="2" charset="2"/>
+              <a:buChar char="§"/>
+            </a:pPr>
+            <a:r>
+              <a:rPr lang="id-ID" dirty="0" err="1"/>
+              <a:t>InvertStencilOp</a:t>
+            </a:r>
+            <a:endParaRPr lang="id-ID" dirty="0"/>
+          </a:p>
+        </p:txBody>
+      </p:sp>
+    </p:spTree>
+    <p:extLst>
+      <p:ext uri="{BB962C8B-B14F-4D97-AF65-F5344CB8AC3E}">
+        <p14:creationId xmlns:p14="http://schemas.microsoft.com/office/powerpoint/2010/main" val="105140028"/>
       </p:ext>
     </p:extLst>
   </p:cSld>
@@ -4965,6 +7906,15 @@
 </file>
 
 <file path=customXml/item1.xml><?xml version="1.0" encoding="utf-8"?>
+<?mso-contentType ?>
+<FormTemplates xmlns="http://schemas.microsoft.com/sharepoint/v3/contenttype/forms">
+  <Display>DocumentLibraryForm</Display>
+  <Edit>DocumentLibraryForm</Edit>
+  <New>DocumentLibraryForm</New>
+</FormTemplates>
+</file>
+
+<file path=customXml/item2.xml><?xml version="1.0" encoding="utf-8"?>
 <p:properties xmlns:p="http://schemas.microsoft.com/office/2006/metadata/properties" xmlns:xsi="http://www.w3.org/2001/XMLSchema-instance" xmlns:pc="http://schemas.microsoft.com/office/infopath/2007/PartnerControls">
   <documentManagement>
     <Status xmlns="71af3243-3dd4-4a8d-8c0d-dd76da1f02a5">Not started</Status>
@@ -4973,7 +7923,7 @@
 </p:properties>
 </file>
 
-<file path=customXml/item2.xml><?xml version="1.0" encoding="utf-8"?>
+<file path=customXml/item3.xml><?xml version="1.0" encoding="utf-8"?>
 <ct:contentTypeSchema xmlns:ct="http://schemas.microsoft.com/office/2006/metadata/contentType" xmlns:ma="http://schemas.microsoft.com/office/2006/metadata/properties/metaAttributes" ct:_="" ma:_="" ma:contentTypeName="Document" ma:contentTypeID="0x01010079F111ED35F8CC479449609E8A0923A6" ma:contentTypeVersion="12" ma:contentTypeDescription="Create a new document." ma:contentTypeScope="" ma:versionID="a410dd7f93c95333ffa1b60ed6adedd1">
   <xsd:schema xmlns:xsd="http://www.w3.org/2001/XMLSchema" xmlns:xs="http://www.w3.org/2001/XMLSchema" xmlns:p="http://schemas.microsoft.com/office/2006/metadata/properties" xmlns:ns2="71af3243-3dd4-4a8d-8c0d-dd76da1f02a5" xmlns:ns3="16c05727-aa75-4e4a-9b5f-8a80a1165891" targetNamespace="http://schemas.microsoft.com/office/2006/metadata/properties" ma:root="true" ma:fieldsID="a936d9baba76aa3866493feff160faab" ns2:_="" ns3:_="">
     <xsd:import namespace="71af3243-3dd4-4a8d-8c0d-dd76da1f02a5"/>
@@ -5194,16 +8144,15 @@
 </ct:contentTypeSchema>
 </file>
 
-<file path=customXml/item3.xml><?xml version="1.0" encoding="utf-8"?>
-<?mso-contentType ?>
-<FormTemplates xmlns="http://schemas.microsoft.com/sharepoint/v3/contenttype/forms">
-  <Display>DocumentLibraryForm</Display>
-  <Edit>DocumentLibraryForm</Edit>
-  <New>DocumentLibraryForm</New>
-</FormTemplates>
+<file path=customXml/itemProps1.xml><?xml version="1.0" encoding="utf-8"?>
+<ds:datastoreItem xmlns:ds="http://schemas.openxmlformats.org/officeDocument/2006/customXml" ds:itemID="{638A3B04-B0F3-4C12-A722-52B5CF6D9723}">
+  <ds:schemaRefs>
+    <ds:schemaRef ds:uri="http://schemas.microsoft.com/sharepoint/v3/contenttype/forms"/>
+  </ds:schemaRefs>
+</ds:datastoreItem>
 </file>
 
-<file path=customXml/itemProps1.xml><?xml version="1.0" encoding="utf-8"?>
+<file path=customXml/itemProps2.xml><?xml version="1.0" encoding="utf-8"?>
 <ds:datastoreItem xmlns:ds="http://schemas.openxmlformats.org/officeDocument/2006/customXml" ds:itemID="{4F5B1FD9-3BB6-4DA9-A089-3B68C2323D4F}">
   <ds:schemaRefs>
     <ds:schemaRef ds:uri="http://schemas.microsoft.com/office/2006/metadata/properties"/>
@@ -5213,7 +8162,7 @@
 </ds:datastoreItem>
 </file>
 
-<file path=customXml/itemProps2.xml><?xml version="1.0" encoding="utf-8"?>
+<file path=customXml/itemProps3.xml><?xml version="1.0" encoding="utf-8"?>
 <ds:datastoreItem xmlns:ds="http://schemas.openxmlformats.org/officeDocument/2006/customXml" ds:itemID="{1747A963-53E0-44AF-AF13-963FE676C682}">
   <ds:schemaRefs>
     <ds:schemaRef ds:uri="http://schemas.microsoft.com/office/2006/metadata/contentType"/>
@@ -5230,12 +8179,4 @@
     <ds:schemaRef ds:uri="http://schemas.microsoft.com/internal/obd"/>
   </ds:schemaRefs>
 </ds:datastoreItem>
-</file>
-
-<file path=customXml/itemProps3.xml><?xml version="1.0" encoding="utf-8"?>
-<ds:datastoreItem xmlns:ds="http://schemas.openxmlformats.org/officeDocument/2006/customXml" ds:itemID="{638A3B04-B0F3-4C12-A722-52B5CF6D9723}">
-  <ds:schemaRefs>
-    <ds:schemaRef ds:uri="http://schemas.microsoft.com/sharepoint/v3/contenttype/forms"/>
-  </ds:schemaRefs>
-</ds:datastoreItem>
 </file>
</xml_diff>